<commit_message>
Eind poster versie 2
</commit_message>
<xml_diff>
--- a/Posters/PosterTemplateEIND.pptx
+++ b/Posters/PosterTemplateEIND.pptx
@@ -4408,10 +4408,10 @@
               <a:buNone/>
             </a:pPr>
             <a:r>
-              <a:rPr lang="en-US" sz="1400" dirty="0" smtClean="0"/>
+              <a:rPr lang="en-US" sz="1300" dirty="0" smtClean="0"/>
               <a:t>These days is impossible to fill in all the cars you see by hand to find them in a car database. Therefore we thought it should be possible to make this easier with the technology and knowledge of these days. Therefore we made an application in MATLAB that is able to recognize license plates of cars and to write them down. For this application we used several image processing techniques to recognize the license plates.</a:t>
             </a:r>
-            <a:endParaRPr lang="nl-NL" sz="1400" dirty="0"/>
+            <a:endParaRPr lang="nl-NL" sz="1300" dirty="0"/>
           </a:p>
         </p:txBody>
       </p:sp>
@@ -4542,8 +4542,8 @@
         </p:nvSpPr>
         <p:spPr>
           <a:xfrm>
-            <a:off x="10878463" y="2671584"/>
-            <a:ext cx="4814249" cy="3931637"/>
+            <a:off x="10837316" y="2700387"/>
+            <a:ext cx="4814249" cy="5184576"/>
           </a:xfrm>
           <a:ln/>
         </p:spPr>
@@ -4563,7 +4563,7 @@
         </p:style>
         <p:txBody>
           <a:bodyPr>
-            <a:normAutofit/>
+            <a:normAutofit lnSpcReduction="10000"/>
           </a:bodyPr>
           <a:lstStyle/>
           <a:p>
@@ -4571,10 +4571,107 @@
               <a:buNone/>
             </a:pPr>
             <a:r>
-              <a:rPr lang="nl-NL" sz="1500" dirty="0" err="1" smtClean="0"/>
-              <a:t>Text</a:t>
-            </a:r>
-            <a:endParaRPr lang="nl-NL" sz="1500" dirty="0"/>
+              <a:rPr lang="en-US" sz="1300" dirty="0" smtClean="0"/>
+              <a:t>A important part of the application is the segmentation which is the first part of the process. </a:t>
+            </a:r>
+            <a:r>
+              <a:rPr lang="en-US" sz="1300" dirty="0" smtClean="0"/>
+              <a:t>This part has the task of locating the license plate. The segmentation is done in the RGB domain. Therefore we looked at different kind of license plates and we made graphs of the data we acquired. With these graphs we made restrictions for our segmentation function. This is an example of one of those graphs:</a:t>
+            </a:r>
+          </a:p>
+          <a:p>
+            <a:pPr marL="0" indent="0">
+              <a:buNone/>
+            </a:pPr>
+            <a:endParaRPr lang="en-US" sz="1300" dirty="0" smtClean="0"/>
+          </a:p>
+          <a:p>
+            <a:pPr marL="0" indent="0">
+              <a:buNone/>
+            </a:pPr>
+            <a:endParaRPr lang="en-US" sz="1300" dirty="0" smtClean="0"/>
+          </a:p>
+          <a:p>
+            <a:pPr marL="0" indent="0">
+              <a:buNone/>
+            </a:pPr>
+            <a:endParaRPr lang="en-US" sz="1300" dirty="0" smtClean="0"/>
+          </a:p>
+          <a:p>
+            <a:pPr marL="0" indent="0">
+              <a:buNone/>
+            </a:pPr>
+            <a:endParaRPr lang="en-US" sz="1300" dirty="0" smtClean="0"/>
+          </a:p>
+          <a:p>
+            <a:pPr marL="0" indent="0">
+              <a:buNone/>
+            </a:pPr>
+            <a:endParaRPr lang="en-US" sz="1300" dirty="0" smtClean="0"/>
+          </a:p>
+          <a:p>
+            <a:pPr marL="0" indent="0">
+              <a:buNone/>
+            </a:pPr>
+            <a:endParaRPr lang="en-US" sz="1300" dirty="0" smtClean="0"/>
+          </a:p>
+          <a:p>
+            <a:pPr marL="0" indent="0">
+              <a:buNone/>
+            </a:pPr>
+            <a:endParaRPr lang="en-US" sz="1300" dirty="0" smtClean="0"/>
+          </a:p>
+          <a:p>
+            <a:pPr marL="0" indent="0">
+              <a:buNone/>
+            </a:pPr>
+            <a:endParaRPr lang="en-US" sz="1300" dirty="0" smtClean="0"/>
+          </a:p>
+          <a:p>
+            <a:pPr marL="0" indent="0">
+              <a:buNone/>
+            </a:pPr>
+            <a:endParaRPr lang="en-US" sz="1300" dirty="0" smtClean="0"/>
+          </a:p>
+          <a:p>
+            <a:pPr marL="0" indent="0">
+              <a:buNone/>
+            </a:pPr>
+            <a:endParaRPr lang="en-US" sz="1300" dirty="0" smtClean="0"/>
+          </a:p>
+          <a:p>
+            <a:pPr marL="0" indent="0">
+              <a:buNone/>
+            </a:pPr>
+            <a:endParaRPr lang="en-US" sz="1300" dirty="0" smtClean="0"/>
+          </a:p>
+          <a:p>
+            <a:pPr marL="0" indent="0">
+              <a:buNone/>
+            </a:pPr>
+            <a:endParaRPr lang="en-US" sz="1300" dirty="0" smtClean="0"/>
+          </a:p>
+          <a:p>
+            <a:pPr marL="0" indent="0">
+              <a:buNone/>
+            </a:pPr>
+            <a:endParaRPr lang="en-US" sz="1300" dirty="0" smtClean="0"/>
+          </a:p>
+          <a:p>
+            <a:pPr marL="0" indent="0">
+              <a:buNone/>
+            </a:pPr>
+            <a:endParaRPr lang="en-US" sz="1300" dirty="0" smtClean="0"/>
+          </a:p>
+          <a:p>
+            <a:pPr marL="0" indent="0">
+              <a:buNone/>
+            </a:pPr>
+            <a:r>
+              <a:rPr lang="en-US" sz="1300" dirty="0" smtClean="0"/>
+              <a:t>After checking the frame with the restrictions we segment the license plate from the hole frame and process this plate further with the character recognition</a:t>
+            </a:r>
+            <a:endParaRPr lang="nl-NL" sz="1300" dirty="0"/>
           </a:p>
         </p:txBody>
       </p:sp>
@@ -4590,7 +4687,7 @@
           <a:blip r:embed="rId2" cstate="print">
             <a:extLst>
               <a:ext uri="{28A0092B-C50C-407E-A947-70E740481C1C}">
-                <a14:useLocalDpi xmlns:a14="http://schemas.microsoft.com/office/drawing/2010/main" xmlns="" val="0"/>
+                <a14:useLocalDpi xmlns="" xmlns:a14="http://schemas.microsoft.com/office/drawing/2010/main" val="0"/>
               </a:ext>
             </a:extLst>
           </a:blip>
@@ -4610,7 +4707,7 @@
           <a:noFill/>
           <a:extLst>
             <a:ext uri="{909E8E84-426E-40DD-AFC4-6F175D3DCCD1}">
-              <a14:hiddenFill xmlns:a14="http://schemas.microsoft.com/office/drawing/2010/main" xmlns="">
+              <a14:hiddenFill xmlns="" xmlns:a14="http://schemas.microsoft.com/office/drawing/2010/main">
                 <a:solidFill>
                   <a:srgbClr val="FFFFFF"/>
                 </a:solidFill>
@@ -4859,7 +4956,7 @@
         <p:spPr>
           <a:xfrm>
             <a:off x="684188" y="5940747"/>
-            <a:ext cx="4814249" cy="4910945"/>
+            <a:ext cx="4814249" cy="5544616"/>
           </a:xfrm>
           <a:ln/>
         </p:spPr>
@@ -4888,14 +4985,22 @@
             </a:pPr>
             <a:r>
               <a:rPr lang="en-US" sz="1400" dirty="0" smtClean="0"/>
-              <a:t>For our application we needed a GUI, that’s why we used the MATLAB toolbox</a:t>
-            </a:r>
-            <a:r>
-              <a:rPr lang="en-US" sz="1400" i="1" dirty="0" smtClean="0"/>
               <a:t> </a:t>
             </a:r>
             <a:r>
               <a:rPr lang="en-US" sz="1400" dirty="0" smtClean="0"/>
+              <a:t>F</a:t>
+            </a:r>
+            <a:r>
+              <a:rPr lang="en-US" sz="1300" dirty="0" smtClean="0"/>
+              <a:t>or our application we needed a GUI, that’s why we used the MATLAB toolbox</a:t>
+            </a:r>
+            <a:r>
+              <a:rPr lang="en-US" sz="1300" i="1" dirty="0" smtClean="0"/>
+              <a:t> </a:t>
+            </a:r>
+            <a:r>
+              <a:rPr lang="en-US" sz="1300" dirty="0" smtClean="0"/>
               <a:t>guide. As a result of this we made this GUI:</a:t>
             </a:r>
           </a:p>
@@ -4903,6 +5008,124 @@
             <a:pPr marL="0" indent="0">
               <a:buNone/>
             </a:pPr>
+            <a:endParaRPr lang="en-US" sz="1300" dirty="0" smtClean="0"/>
+          </a:p>
+          <a:p>
+            <a:pPr marL="0" indent="0">
+              <a:buNone/>
+            </a:pPr>
+            <a:endParaRPr lang="en-US" sz="1300" dirty="0" smtClean="0"/>
+          </a:p>
+          <a:p>
+            <a:pPr marL="0" indent="0">
+              <a:buNone/>
+            </a:pPr>
+            <a:endParaRPr lang="en-US" sz="1300" dirty="0" smtClean="0"/>
+          </a:p>
+          <a:p>
+            <a:pPr marL="0" indent="0">
+              <a:buNone/>
+            </a:pPr>
+            <a:endParaRPr lang="en-US" sz="1300" dirty="0" smtClean="0"/>
+          </a:p>
+          <a:p>
+            <a:pPr marL="0" indent="0">
+              <a:buNone/>
+            </a:pPr>
+            <a:endParaRPr lang="en-US" sz="1300" dirty="0" smtClean="0"/>
+          </a:p>
+          <a:p>
+            <a:pPr marL="0" indent="0">
+              <a:buNone/>
+            </a:pPr>
+            <a:endParaRPr lang="en-US" sz="1300" dirty="0" smtClean="0"/>
+          </a:p>
+          <a:p>
+            <a:pPr marL="0" indent="0">
+              <a:buNone/>
+            </a:pPr>
+            <a:endParaRPr lang="en-US" sz="1300" dirty="0" smtClean="0"/>
+          </a:p>
+          <a:p>
+            <a:pPr marL="0" indent="0">
+              <a:buNone/>
+            </a:pPr>
+            <a:endParaRPr lang="en-US" sz="1300" dirty="0" smtClean="0"/>
+          </a:p>
+          <a:p>
+            <a:pPr marL="0" indent="0">
+              <a:buNone/>
+            </a:pPr>
+            <a:endParaRPr lang="en-US" sz="1300" dirty="0" smtClean="0"/>
+          </a:p>
+          <a:p>
+            <a:pPr marL="0" indent="0">
+              <a:buNone/>
+            </a:pPr>
+            <a:endParaRPr lang="en-US" sz="1300" dirty="0" smtClean="0"/>
+          </a:p>
+          <a:p>
+            <a:pPr marL="0" indent="0">
+              <a:buNone/>
+            </a:pPr>
+            <a:r>
+              <a:rPr lang="en-US" sz="1300" dirty="0" smtClean="0"/>
+              <a:t>The GUI consist of three important parts:</a:t>
+            </a:r>
+          </a:p>
+          <a:p>
+            <a:pPr marL="0" indent="0">
+              <a:buFontTx/>
+              <a:buChar char="-"/>
+            </a:pPr>
+            <a:r>
+              <a:rPr lang="en-US" sz="1300" dirty="0" smtClean="0"/>
+              <a:t>The area where it displays the video to be processed</a:t>
+            </a:r>
+          </a:p>
+          <a:p>
+            <a:pPr marL="0" indent="0">
+              <a:buFontTx/>
+              <a:buChar char="-"/>
+            </a:pPr>
+            <a:r>
+              <a:rPr lang="en-US" sz="1300" dirty="0" smtClean="0"/>
+              <a:t>The three buttons</a:t>
+            </a:r>
+          </a:p>
+          <a:p>
+            <a:pPr marL="0" indent="0">
+              <a:buFontTx/>
+              <a:buChar char="-"/>
+            </a:pPr>
+            <a:r>
+              <a:rPr lang="en-US" sz="1300" dirty="0" smtClean="0"/>
+              <a:t>The list with results</a:t>
+            </a:r>
+          </a:p>
+          <a:p>
+            <a:pPr marL="0" indent="0">
+              <a:buNone/>
+            </a:pPr>
+            <a:r>
+              <a:rPr lang="en-US" sz="1300" dirty="0" smtClean="0"/>
+              <a:t>These three buttons are: An import video button, a start/pause button and a reset button. The GUI also consists of the part which says what frame your are looking at and it has some time indicators like the time the video has played and the average time spend on each frame in </a:t>
+            </a:r>
+            <a:r>
+              <a:rPr lang="en-US" sz="1300" dirty="0" smtClean="0"/>
+              <a:t>milliseconds. The results are displayed in this way: </a:t>
+            </a:r>
+          </a:p>
+          <a:p>
+            <a:pPr marL="0" indent="0">
+              <a:buNone/>
+            </a:pPr>
+            <a:endParaRPr lang="en-US" sz="1300" dirty="0" smtClean="0"/>
+          </a:p>
+          <a:p>
+            <a:pPr marL="0" indent="0">
+              <a:buNone/>
+            </a:pPr>
             <a:endParaRPr lang="en-US" sz="1400" dirty="0" smtClean="0"/>
           </a:p>
           <a:p>
@@ -4957,7 +5180,61 @@
             <a:pPr marL="0" indent="0">
               <a:buNone/>
             </a:pPr>
-            <a:endParaRPr lang="en-US" sz="1400" smtClean="0"/>
+            <a:endParaRPr lang="en-US" sz="1400" dirty="0" smtClean="0"/>
+          </a:p>
+          <a:p>
+            <a:pPr marL="0" indent="0">
+              <a:buNone/>
+            </a:pPr>
+            <a:endParaRPr lang="en-US" sz="1400" dirty="0" smtClean="0"/>
+          </a:p>
+          <a:p>
+            <a:pPr marL="0" indent="0">
+              <a:buNone/>
+            </a:pPr>
+            <a:endParaRPr lang="en-US" sz="1400" dirty="0" smtClean="0"/>
+          </a:p>
+          <a:p>
+            <a:pPr marL="0" indent="0">
+              <a:buNone/>
+            </a:pPr>
+            <a:endParaRPr lang="en-US" sz="1400" dirty="0" smtClean="0"/>
+          </a:p>
+          <a:p>
+            <a:pPr marL="0" indent="0">
+              <a:buNone/>
+            </a:pPr>
+            <a:endParaRPr lang="en-US" sz="1400" dirty="0" smtClean="0"/>
+          </a:p>
+          <a:p>
+            <a:pPr marL="0" indent="0">
+              <a:buNone/>
+            </a:pPr>
+            <a:endParaRPr lang="en-US" sz="1400" dirty="0" smtClean="0"/>
+          </a:p>
+          <a:p>
+            <a:pPr marL="0" indent="0">
+              <a:buNone/>
+            </a:pPr>
+            <a:endParaRPr lang="en-US" sz="1400" dirty="0" smtClean="0"/>
+          </a:p>
+          <a:p>
+            <a:pPr marL="0" indent="0">
+              <a:buNone/>
+            </a:pPr>
+            <a:endParaRPr lang="en-US" sz="1400" dirty="0" smtClean="0"/>
+          </a:p>
+          <a:p>
+            <a:pPr marL="0" indent="0">
+              <a:buNone/>
+            </a:pPr>
+            <a:endParaRPr lang="en-US" sz="1400" dirty="0" smtClean="0"/>
+          </a:p>
+          <a:p>
+            <a:pPr marL="0" indent="0">
+              <a:buNone/>
+            </a:pPr>
+            <a:endParaRPr lang="en-US" sz="1400" dirty="0" smtClean="0"/>
           </a:p>
           <a:p>
             <a:pPr marL="0" indent="0">
@@ -5022,8 +5299,8 @@
         </p:nvSpPr>
         <p:spPr>
           <a:xfrm>
-            <a:off x="10878463" y="7524924"/>
-            <a:ext cx="4814249" cy="3672408"/>
+            <a:off x="10878463" y="8461026"/>
+            <a:ext cx="4814249" cy="2736305"/>
           </a:xfrm>
           <a:ln/>
         </p:spPr>
@@ -5051,10 +5328,52 @@
               <a:buNone/>
             </a:pPr>
             <a:r>
-              <a:rPr lang="nl-NL" sz="1500" dirty="0" err="1" smtClean="0"/>
-              <a:t>Text</a:t>
-            </a:r>
-            <a:endParaRPr lang="nl-NL" sz="1500" dirty="0"/>
+              <a:rPr lang="en-US" sz="1300" dirty="0" smtClean="0"/>
+              <a:t>After we several weeks of processing this project has come to an end. Obviously we made a very good license plate recognition application, but there are always points to improve. </a:t>
+            </a:r>
+            <a:r>
+              <a:rPr lang="en-US" sz="1300" dirty="0" smtClean="0"/>
+              <a:t>This a list of some thing we could have done better:</a:t>
+            </a:r>
+          </a:p>
+          <a:p>
+            <a:pPr marL="0" indent="0">
+              <a:buFontTx/>
+              <a:buChar char="-"/>
+            </a:pPr>
+            <a:r>
+              <a:rPr lang="en-US" sz="1300" dirty="0" smtClean="0"/>
+              <a:t>In this application were are only able to recognize Dutch</a:t>
+            </a:r>
+            <a:r>
+              <a:rPr lang="en-US" sz="1300" dirty="0" smtClean="0"/>
+              <a:t> yellow license plates, all the others are not seen by the system because of the implementation of the segmentation</a:t>
+            </a:r>
+          </a:p>
+          <a:p>
+            <a:pPr marL="0" indent="0">
+              <a:buFontTx/>
+              <a:buChar char="-"/>
+            </a:pPr>
+            <a:r>
+              <a:rPr lang="en-US" sz="1300" dirty="0" smtClean="0"/>
+              <a:t>When there are two license plate on 1 frame we are not able to detect this either</a:t>
+            </a:r>
+          </a:p>
+          <a:p>
+            <a:pPr marL="0" indent="0">
+              <a:buFontTx/>
+              <a:buChar char="-"/>
+            </a:pPr>
+            <a:r>
+              <a:rPr lang="en-US" sz="1300" dirty="0" smtClean="0"/>
+              <a:t>In some cases, when the yellow license plates are heavily obscured or overexposed by its environment or the sun, we weren't able to detect </a:t>
+            </a:r>
+            <a:r>
+              <a:rPr lang="en-US" sz="1300" smtClean="0"/>
+              <a:t>the plates.  </a:t>
+            </a:r>
+            <a:endParaRPr lang="nl-NL" sz="1300" dirty="0"/>
           </a:p>
         </p:txBody>
       </p:sp>
@@ -5070,7 +5389,7 @@
         </p:nvSpPr>
         <p:spPr>
           <a:xfrm>
-            <a:off x="10878463" y="6603220"/>
+            <a:off x="10837316" y="7740947"/>
             <a:ext cx="4814249" cy="777687"/>
           </a:xfrm>
         </p:spPr>
@@ -5133,8 +5452,8 @@
         </p:nvCxnSpPr>
         <p:spPr>
           <a:xfrm>
-            <a:off x="10909324" y="7524923"/>
-            <a:ext cx="4814249" cy="0"/>
+            <a:off x="10837316" y="8461027"/>
+            <a:ext cx="4886257" cy="0"/>
           </a:xfrm>
           <a:prstGeom prst="line">
             <a:avLst/>
@@ -5174,7 +5493,73 @@
         <p:spPr bwMode="auto">
           <a:xfrm>
             <a:off x="684188" y="6516811"/>
-            <a:ext cx="4729023" cy="2284537"/>
+            <a:ext cx="4769842" cy="2304256"/>
+          </a:xfrm>
+          <a:prstGeom prst="rect">
+            <a:avLst/>
+          </a:prstGeom>
+          <a:noFill/>
+          <a:ln w="9525">
+            <a:noFill/>
+            <a:miter lim="800000"/>
+            <a:headEnd/>
+            <a:tailEnd/>
+          </a:ln>
+          <a:effectLst/>
+        </p:spPr>
+      </p:pic>
+      <p:pic>
+        <p:nvPicPr>
+          <p:cNvPr id="28" name="Picture 2"/>
+          <p:cNvPicPr>
+            <a:picLocks noChangeAspect="1" noChangeArrowheads="1"/>
+          </p:cNvPicPr>
+          <p:nvPr/>
+        </p:nvPicPr>
+        <p:blipFill>
+          <a:blip r:embed="rId4" cstate="print"/>
+          <a:srcRect/>
+          <a:stretch>
+            <a:fillRect/>
+          </a:stretch>
+        </p:blipFill>
+        <p:spPr bwMode="auto">
+          <a:xfrm>
+            <a:off x="10981332" y="4140547"/>
+            <a:ext cx="4484498" cy="2736304"/>
+          </a:xfrm>
+          <a:prstGeom prst="rect">
+            <a:avLst/>
+          </a:prstGeom>
+          <a:noFill/>
+          <a:ln w="9525">
+            <a:noFill/>
+            <a:miter lim="800000"/>
+            <a:headEnd/>
+            <a:tailEnd/>
+          </a:ln>
+          <a:effectLst/>
+        </p:spPr>
+      </p:pic>
+      <p:pic>
+        <p:nvPicPr>
+          <p:cNvPr id="2" name="Picture 2"/>
+          <p:cNvPicPr>
+            <a:picLocks noChangeAspect="1" noChangeArrowheads="1"/>
+          </p:cNvPicPr>
+          <p:nvPr/>
+        </p:nvPicPr>
+        <p:blipFill>
+          <a:blip r:embed="rId5" cstate="print"/>
+          <a:srcRect/>
+          <a:stretch>
+            <a:fillRect/>
+          </a:stretch>
+        </p:blipFill>
+        <p:spPr bwMode="auto">
+          <a:xfrm>
+            <a:off x="828204" y="11053315"/>
+            <a:ext cx="4392488" cy="251478"/>
           </a:xfrm>
           <a:prstGeom prst="rect">
             <a:avLst/>
@@ -5192,7 +5577,7 @@
     </p:spTree>
     <p:extLst>
       <p:ext uri="{BB962C8B-B14F-4D97-AF65-F5344CB8AC3E}">
-        <p14:creationId xmlns:p14="http://schemas.microsoft.com/office/powerpoint/2010/main" xmlns="" val="2651525738"/>
+        <p14:creationId xmlns="" xmlns:p14="http://schemas.microsoft.com/office/powerpoint/2010/main" val="2651525738"/>
       </p:ext>
     </p:extLst>
   </p:cSld>

</xml_diff>

<commit_message>
Laatste poster met mijn deel + aangepast
</commit_message>
<xml_diff>
--- a/Posters/PosterTemplateEIND.pptx
+++ b/Posters/PosterTemplateEIND.pptx
@@ -7,14 +7,14 @@
   <p:sldIdLst>
     <p:sldId id="256" r:id="rId2"/>
   </p:sldIdLst>
-  <p:sldSz cx="16202025" cy="12601575"/>
+  <p:sldSz cx="12803188" cy="9602788"/>
   <p:notesSz cx="6858000" cy="9144000"/>
   <p:defaultTextStyle>
     <a:defPPr>
       <a:defRPr lang="nl-NL"/>
     </a:defPPr>
-    <a:lvl1pPr marL="0" algn="l" defTabSz="1508722" rtl="0" eaLnBrk="1" latinLnBrk="0" hangingPunct="1">
-      <a:defRPr sz="2900" kern="1200">
+    <a:lvl1pPr marL="0" algn="l" defTabSz="1173490" rtl="0" eaLnBrk="1" latinLnBrk="0" hangingPunct="1">
+      <a:defRPr sz="2300" kern="1200">
         <a:solidFill>
           <a:schemeClr val="tx1"/>
         </a:solidFill>
@@ -23,8 +23,8 @@
         <a:cs typeface="+mn-cs"/>
       </a:defRPr>
     </a:lvl1pPr>
-    <a:lvl2pPr marL="754361" algn="l" defTabSz="1508722" rtl="0" eaLnBrk="1" latinLnBrk="0" hangingPunct="1">
-      <a:defRPr sz="2900" kern="1200">
+    <a:lvl2pPr marL="586745" algn="l" defTabSz="1173490" rtl="0" eaLnBrk="1" latinLnBrk="0" hangingPunct="1">
+      <a:defRPr sz="2300" kern="1200">
         <a:solidFill>
           <a:schemeClr val="tx1"/>
         </a:solidFill>
@@ -33,8 +33,8 @@
         <a:cs typeface="+mn-cs"/>
       </a:defRPr>
     </a:lvl2pPr>
-    <a:lvl3pPr marL="1508722" algn="l" defTabSz="1508722" rtl="0" eaLnBrk="1" latinLnBrk="0" hangingPunct="1">
-      <a:defRPr sz="2900" kern="1200">
+    <a:lvl3pPr marL="1173490" algn="l" defTabSz="1173490" rtl="0" eaLnBrk="1" latinLnBrk="0" hangingPunct="1">
+      <a:defRPr sz="2300" kern="1200">
         <a:solidFill>
           <a:schemeClr val="tx1"/>
         </a:solidFill>
@@ -43,8 +43,8 @@
         <a:cs typeface="+mn-cs"/>
       </a:defRPr>
     </a:lvl3pPr>
-    <a:lvl4pPr marL="2263083" algn="l" defTabSz="1508722" rtl="0" eaLnBrk="1" latinLnBrk="0" hangingPunct="1">
-      <a:defRPr sz="2900" kern="1200">
+    <a:lvl4pPr marL="1760235" algn="l" defTabSz="1173490" rtl="0" eaLnBrk="1" latinLnBrk="0" hangingPunct="1">
+      <a:defRPr sz="2300" kern="1200">
         <a:solidFill>
           <a:schemeClr val="tx1"/>
         </a:solidFill>
@@ -53,8 +53,8 @@
         <a:cs typeface="+mn-cs"/>
       </a:defRPr>
     </a:lvl4pPr>
-    <a:lvl5pPr marL="3017445" algn="l" defTabSz="1508722" rtl="0" eaLnBrk="1" latinLnBrk="0" hangingPunct="1">
-      <a:defRPr sz="2900" kern="1200">
+    <a:lvl5pPr marL="2346982" algn="l" defTabSz="1173490" rtl="0" eaLnBrk="1" latinLnBrk="0" hangingPunct="1">
+      <a:defRPr sz="2300" kern="1200">
         <a:solidFill>
           <a:schemeClr val="tx1"/>
         </a:solidFill>
@@ -63,8 +63,8 @@
         <a:cs typeface="+mn-cs"/>
       </a:defRPr>
     </a:lvl5pPr>
-    <a:lvl6pPr marL="3771806" algn="l" defTabSz="1508722" rtl="0" eaLnBrk="1" latinLnBrk="0" hangingPunct="1">
-      <a:defRPr sz="2900" kern="1200">
+    <a:lvl6pPr marL="2933727" algn="l" defTabSz="1173490" rtl="0" eaLnBrk="1" latinLnBrk="0" hangingPunct="1">
+      <a:defRPr sz="2300" kern="1200">
         <a:solidFill>
           <a:schemeClr val="tx1"/>
         </a:solidFill>
@@ -73,8 +73,8 @@
         <a:cs typeface="+mn-cs"/>
       </a:defRPr>
     </a:lvl6pPr>
-    <a:lvl7pPr marL="4526167" algn="l" defTabSz="1508722" rtl="0" eaLnBrk="1" latinLnBrk="0" hangingPunct="1">
-      <a:defRPr sz="2900" kern="1200">
+    <a:lvl7pPr marL="3520472" algn="l" defTabSz="1173490" rtl="0" eaLnBrk="1" latinLnBrk="0" hangingPunct="1">
+      <a:defRPr sz="2300" kern="1200">
         <a:solidFill>
           <a:schemeClr val="tx1"/>
         </a:solidFill>
@@ -83,8 +83,8 @@
         <a:cs typeface="+mn-cs"/>
       </a:defRPr>
     </a:lvl7pPr>
-    <a:lvl8pPr marL="5280528" algn="l" defTabSz="1508722" rtl="0" eaLnBrk="1" latinLnBrk="0" hangingPunct="1">
-      <a:defRPr sz="2900" kern="1200">
+    <a:lvl8pPr marL="4107218" algn="l" defTabSz="1173490" rtl="0" eaLnBrk="1" latinLnBrk="0" hangingPunct="1">
+      <a:defRPr sz="2300" kern="1200">
         <a:solidFill>
           <a:schemeClr val="tx1"/>
         </a:solidFill>
@@ -93,8 +93,8 @@
         <a:cs typeface="+mn-cs"/>
       </a:defRPr>
     </a:lvl8pPr>
-    <a:lvl9pPr marL="6034889" algn="l" defTabSz="1508722" rtl="0" eaLnBrk="1" latinLnBrk="0" hangingPunct="1">
-      <a:defRPr sz="2900" kern="1200">
+    <a:lvl9pPr marL="4693962" algn="l" defTabSz="1173490" rtl="0" eaLnBrk="1" latinLnBrk="0" hangingPunct="1">
+      <a:defRPr sz="2300" kern="1200">
         <a:solidFill>
           <a:schemeClr val="tx1"/>
         </a:solidFill>
@@ -132,8 +132,8 @@
         </p:nvSpPr>
         <p:spPr>
           <a:xfrm>
-            <a:off x="3" y="2"/>
-            <a:ext cx="1333292" cy="12601575"/>
+            <a:off x="3" y="1"/>
+            <a:ext cx="1053596" cy="9602788"/>
           </a:xfrm>
           <a:prstGeom prst="rect">
             <a:avLst/>
@@ -185,7 +185,7 @@
           </a:fontRef>
         </p:style>
         <p:txBody>
-          <a:bodyPr lIns="150872" tIns="75437" rIns="150872" bIns="75437" rtlCol="0" anchor="ctr"/>
+          <a:bodyPr lIns="117350" tIns="58675" rIns="117350" bIns="58675" rtlCol="0" anchor="ctr"/>
           <a:lstStyle/>
           <a:p>
             <a:pPr algn="ctr"/>
@@ -213,15 +213,15 @@
         </p:nvSpPr>
         <p:spPr>
           <a:xfrm>
-            <a:off x="2154872" y="2329006"/>
-            <a:ext cx="12821255" cy="9432468"/>
+            <a:off x="1702826" y="1774774"/>
+            <a:ext cx="10131631" cy="7187831"/>
           </a:xfrm>
         </p:spPr>
         <p:txBody>
           <a:bodyPr/>
           <a:lstStyle>
             <a:lvl1pPr>
-              <a:defRPr sz="18900"/>
+              <a:defRPr sz="14700"/>
             </a:lvl1pPr>
           </a:lstStyle>
           <a:p>
@@ -245,8 +245,8 @@
         </p:nvSpPr>
         <p:spPr>
           <a:xfrm>
-            <a:off x="2154871" y="370631"/>
-            <a:ext cx="10967167" cy="1744833"/>
+            <a:off x="1702828" y="282433"/>
+            <a:ext cx="8666490" cy="1329617"/>
           </a:xfrm>
         </p:spPr>
         <p:txBody>
@@ -256,7 +256,7 @@
           <a:lstStyle>
             <a:lvl1pPr marL="0" indent="0" algn="r">
               <a:buNone/>
-              <a:defRPr sz="4000">
+              <a:defRPr sz="3100">
                 <a:solidFill>
                   <a:schemeClr val="tx2">
                     <a:lumMod val="60000"/>
@@ -265,7 +265,7 @@
                 </a:solidFill>
               </a:defRPr>
             </a:lvl1pPr>
-            <a:lvl2pPr marL="754361" indent="0" algn="ctr">
+            <a:lvl2pPr marL="586745" indent="0" algn="ctr">
               <a:buNone/>
               <a:defRPr>
                 <a:solidFill>
@@ -275,7 +275,7 @@
                 </a:solidFill>
               </a:defRPr>
             </a:lvl2pPr>
-            <a:lvl3pPr marL="1508722" indent="0" algn="ctr">
+            <a:lvl3pPr marL="1173490" indent="0" algn="ctr">
               <a:buNone/>
               <a:defRPr>
                 <a:solidFill>
@@ -285,7 +285,7 @@
                 </a:solidFill>
               </a:defRPr>
             </a:lvl3pPr>
-            <a:lvl4pPr marL="2263083" indent="0" algn="ctr">
+            <a:lvl4pPr marL="1760235" indent="0" algn="ctr">
               <a:buNone/>
               <a:defRPr>
                 <a:solidFill>
@@ -295,7 +295,7 @@
                 </a:solidFill>
               </a:defRPr>
             </a:lvl4pPr>
-            <a:lvl5pPr marL="3017445" indent="0" algn="ctr">
+            <a:lvl5pPr marL="2346982" indent="0" algn="ctr">
               <a:buNone/>
               <a:defRPr>
                 <a:solidFill>
@@ -305,7 +305,7 @@
                 </a:solidFill>
               </a:defRPr>
             </a:lvl5pPr>
-            <a:lvl6pPr marL="3771806" indent="0" algn="ctr">
+            <a:lvl6pPr marL="2933727" indent="0" algn="ctr">
               <a:buNone/>
               <a:defRPr>
                 <a:solidFill>
@@ -315,7 +315,7 @@
                 </a:solidFill>
               </a:defRPr>
             </a:lvl6pPr>
-            <a:lvl7pPr marL="4526167" indent="0" algn="ctr">
+            <a:lvl7pPr marL="3520472" indent="0" algn="ctr">
               <a:buNone/>
               <a:defRPr>
                 <a:solidFill>
@@ -325,7 +325,7 @@
                 </a:solidFill>
               </a:defRPr>
             </a:lvl7pPr>
-            <a:lvl8pPr marL="5280528" indent="0" algn="ctr">
+            <a:lvl8pPr marL="4107218" indent="0" algn="ctr">
               <a:buNone/>
               <a:defRPr>
                 <a:solidFill>
@@ -335,7 +335,7 @@
                 </a:solidFill>
               </a:defRPr>
             </a:lvl8pPr>
-            <a:lvl9pPr marL="6034889" indent="0" algn="ctr">
+            <a:lvl9pPr marL="4693962" indent="0" algn="ctr">
               <a:buNone/>
               <a:defRPr>
                 <a:solidFill>
@@ -410,15 +410,15 @@
         </p:nvSpPr>
         <p:spPr>
           <a:xfrm>
-            <a:off x="14441614" y="434415"/>
-            <a:ext cx="1391455" cy="670918"/>
+            <a:off x="11412075" y="331040"/>
+            <a:ext cx="1099558" cy="511260"/>
           </a:xfrm>
         </p:spPr>
         <p:txBody>
           <a:bodyPr/>
           <a:lstStyle>
             <a:lvl1pPr>
-              <a:defRPr sz="2300"/>
+              <a:defRPr sz="1700"/>
             </a:lvl1pPr>
           </a:lstStyle>
           <a:p>
@@ -439,8 +439,8 @@
         </p:nvGrpSpPr>
         <p:grpSpPr>
           <a:xfrm>
-            <a:off x="13231655" y="385048"/>
-            <a:ext cx="1164522" cy="793433"/>
+            <a:off x="10455939" y="293419"/>
+            <a:ext cx="920231" cy="604620"/>
             <a:chOff x="7467600" y="209550"/>
             <a:chExt cx="657226" cy="431800"/>
           </a:xfrm>
@@ -1079,8 +1079,8 @@
         </p:nvSpPr>
         <p:spPr>
           <a:xfrm>
-            <a:off x="11746469" y="504650"/>
-            <a:ext cx="3645456" cy="10752178"/>
+            <a:off x="9282312" y="384561"/>
+            <a:ext cx="2880717" cy="8193490"/>
           </a:xfrm>
         </p:spPr>
         <p:txBody>
@@ -1107,8 +1107,8 @@
         </p:nvSpPr>
         <p:spPr>
           <a:xfrm>
-            <a:off x="810102" y="504650"/>
-            <a:ext cx="10666333" cy="10752178"/>
+            <a:off x="640161" y="384561"/>
+            <a:ext cx="8428765" cy="8193490"/>
           </a:xfrm>
         </p:spPr>
         <p:txBody>
@@ -1263,8 +1263,8 @@
         </p:nvSpPr>
         <p:spPr>
           <a:xfrm>
-            <a:off x="2160272" y="9661207"/>
-            <a:ext cx="12826603" cy="2100263"/>
+            <a:off x="1707093" y="7362137"/>
+            <a:ext cx="10135857" cy="1600465"/>
           </a:xfrm>
         </p:spPr>
         <p:txBody>
@@ -1273,7 +1273,7 @@
           </a:bodyPr>
           <a:lstStyle>
             <a:lvl1pPr algn="l">
-              <a:defRPr sz="11900" baseline="0">
+              <a:defRPr sz="9200" baseline="0">
                 <a:ln w="12700">
                   <a:solidFill>
                     <a:schemeClr val="tx2"/>
@@ -1303,8 +1303,8 @@
         </p:nvSpPr>
         <p:spPr>
           <a:xfrm>
-            <a:off x="2160272" y="1540195"/>
-            <a:ext cx="13231655" cy="8121015"/>
+            <a:off x="1707094" y="1173677"/>
+            <a:ext cx="10455938" cy="6188463"/>
           </a:xfrm>
         </p:spPr>
         <p:txBody>
@@ -1313,31 +1313,31 @@
           </a:bodyPr>
           <a:lstStyle>
             <a:lvl1pPr>
-              <a:defRPr sz="4700"/>
+              <a:defRPr sz="3600"/>
             </a:lvl1pPr>
             <a:lvl2pPr>
-              <a:defRPr sz="2900">
+              <a:defRPr sz="2300">
                 <a:solidFill>
                   <a:schemeClr val="tx1"/>
                 </a:solidFill>
               </a:defRPr>
             </a:lvl2pPr>
             <a:lvl3pPr>
-              <a:defRPr sz="2900">
+              <a:defRPr sz="2300">
                 <a:solidFill>
                   <a:schemeClr val="tx1"/>
                 </a:solidFill>
               </a:defRPr>
             </a:lvl3pPr>
             <a:lvl4pPr>
-              <a:defRPr sz="2900">
+              <a:defRPr sz="2300">
                 <a:solidFill>
                   <a:schemeClr val="tx1"/>
                 </a:solidFill>
               </a:defRPr>
             </a:lvl4pPr>
             <a:lvl5pPr>
-              <a:defRPr sz="2900">
+              <a:defRPr sz="2300">
                 <a:solidFill>
                   <a:schemeClr val="tx1"/>
                 </a:solidFill>
@@ -1493,8 +1493,8 @@
         </p:nvSpPr>
         <p:spPr>
           <a:xfrm>
-            <a:off x="2160269" y="8239499"/>
-            <a:ext cx="12826605" cy="1400175"/>
+            <a:off x="1707093" y="6278752"/>
+            <a:ext cx="10135858" cy="1066976"/>
           </a:xfrm>
         </p:spPr>
         <p:txBody>
@@ -1502,15 +1502,15 @@
           <a:lstStyle>
             <a:lvl1pPr marL="0" indent="0">
               <a:buNone/>
-              <a:defRPr sz="3300">
+              <a:defRPr sz="2500">
                 <a:solidFill>
                   <a:schemeClr val="tx1"/>
                 </a:solidFill>
               </a:defRPr>
             </a:lvl1pPr>
-            <a:lvl2pPr marL="754361" indent="0">
-              <a:buNone/>
-              <a:defRPr sz="2900">
+            <a:lvl2pPr marL="586745" indent="0">
+              <a:buNone/>
+              <a:defRPr sz="2300">
                 <a:solidFill>
                   <a:schemeClr val="tx1">
                     <a:tint val="75000"/>
@@ -1518,9 +1518,9 @@
                 </a:solidFill>
               </a:defRPr>
             </a:lvl2pPr>
-            <a:lvl3pPr marL="1508722" indent="0">
-              <a:buNone/>
-              <a:defRPr sz="2700">
+            <a:lvl3pPr marL="1173490" indent="0">
+              <a:buNone/>
+              <a:defRPr sz="2100">
                 <a:solidFill>
                   <a:schemeClr val="tx1">
                     <a:tint val="75000"/>
@@ -1528,9 +1528,9 @@
                 </a:solidFill>
               </a:defRPr>
             </a:lvl3pPr>
-            <a:lvl4pPr marL="2263083" indent="0">
-              <a:buNone/>
-              <a:defRPr sz="2300">
+            <a:lvl4pPr marL="1760235" indent="0">
+              <a:buNone/>
+              <a:defRPr sz="1700">
                 <a:solidFill>
                   <a:schemeClr val="tx1">
                     <a:tint val="75000"/>
@@ -1538,9 +1538,9 @@
                 </a:solidFill>
               </a:defRPr>
             </a:lvl4pPr>
-            <a:lvl5pPr marL="3017445" indent="0">
-              <a:buNone/>
-              <a:defRPr sz="2300">
+            <a:lvl5pPr marL="2346982" indent="0">
+              <a:buNone/>
+              <a:defRPr sz="1700">
                 <a:solidFill>
                   <a:schemeClr val="tx1">
                     <a:tint val="75000"/>
@@ -1548,9 +1548,9 @@
                 </a:solidFill>
               </a:defRPr>
             </a:lvl5pPr>
-            <a:lvl6pPr marL="3771806" indent="0">
-              <a:buNone/>
-              <a:defRPr sz="2300">
+            <a:lvl6pPr marL="2933727" indent="0">
+              <a:buNone/>
+              <a:defRPr sz="1700">
                 <a:solidFill>
                   <a:schemeClr val="tx1">
                     <a:tint val="75000"/>
@@ -1558,9 +1558,9 @@
                 </a:solidFill>
               </a:defRPr>
             </a:lvl6pPr>
-            <a:lvl7pPr marL="4526167" indent="0">
-              <a:buNone/>
-              <a:defRPr sz="2300">
+            <a:lvl7pPr marL="3520472" indent="0">
+              <a:buNone/>
+              <a:defRPr sz="1700">
                 <a:solidFill>
                   <a:schemeClr val="tx1">
                     <a:tint val="75000"/>
@@ -1568,9 +1568,9 @@
                 </a:solidFill>
               </a:defRPr>
             </a:lvl7pPr>
-            <a:lvl8pPr marL="5280528" indent="0">
-              <a:buNone/>
-              <a:defRPr sz="2300">
+            <a:lvl8pPr marL="4107218" indent="0">
+              <a:buNone/>
+              <a:defRPr sz="1700">
                 <a:solidFill>
                   <a:schemeClr val="tx1">
                     <a:tint val="75000"/>
@@ -1578,9 +1578,9 @@
                 </a:solidFill>
               </a:defRPr>
             </a:lvl8pPr>
-            <a:lvl9pPr marL="6034889" indent="0">
-              <a:buNone/>
-              <a:defRPr sz="2300">
+            <a:lvl9pPr marL="4693962" indent="0">
+              <a:buNone/>
+              <a:defRPr sz="1700">
                 <a:solidFill>
                   <a:schemeClr val="tx1">
                     <a:tint val="75000"/>
@@ -1610,8 +1610,8 @@
         </p:nvSpPr>
         <p:spPr>
           <a:xfrm>
-            <a:off x="2160272" y="9661207"/>
-            <a:ext cx="12826603" cy="2100263"/>
+            <a:off x="1707093" y="7362137"/>
+            <a:ext cx="10135857" cy="1600465"/>
           </a:xfrm>
         </p:spPr>
         <p:txBody>
@@ -1620,7 +1620,7 @@
           </a:bodyPr>
           <a:lstStyle>
             <a:lvl1pPr algn="l">
-              <a:defRPr sz="11900" baseline="0">
+              <a:defRPr sz="9200" baseline="0">
                 <a:ln w="12700">
                   <a:solidFill>
                     <a:schemeClr val="tx2"/>
@@ -1843,8 +1843,8 @@
         </p:nvSpPr>
         <p:spPr>
           <a:xfrm>
-            <a:off x="2154869" y="1545793"/>
-            <a:ext cx="6610427" cy="8065008"/>
+            <a:off x="1702825" y="1177942"/>
+            <a:ext cx="5223701" cy="6145784"/>
           </a:xfrm>
         </p:spPr>
         <p:txBody>
@@ -1900,8 +1900,8 @@
         </p:nvSpPr>
         <p:spPr>
           <a:xfrm>
-            <a:off x="9040731" y="1545793"/>
-            <a:ext cx="6610427" cy="8065008"/>
+            <a:off x="7144181" y="1177942"/>
+            <a:ext cx="5223701" cy="6145784"/>
           </a:xfrm>
         </p:spPr>
         <p:txBody>
@@ -2016,8 +2016,8 @@
         </p:nvSpPr>
         <p:spPr>
           <a:xfrm>
-            <a:off x="2160272" y="1545793"/>
-            <a:ext cx="6615827" cy="980123"/>
+            <a:off x="1707095" y="1177942"/>
+            <a:ext cx="5227968" cy="746884"/>
           </a:xfrm>
         </p:spPr>
         <p:txBody>
@@ -2027,39 +2027,39 @@
           <a:lstStyle>
             <a:lvl1pPr marL="0" indent="0">
               <a:buNone/>
-              <a:defRPr sz="2900" b="1"/>
+              <a:defRPr sz="2300" b="1"/>
             </a:lvl1pPr>
-            <a:lvl2pPr marL="754361" indent="0">
-              <a:buNone/>
-              <a:defRPr sz="3300" b="1"/>
+            <a:lvl2pPr marL="586745" indent="0">
+              <a:buNone/>
+              <a:defRPr sz="2500" b="1"/>
             </a:lvl2pPr>
-            <a:lvl3pPr marL="1508722" indent="0">
-              <a:buNone/>
-              <a:defRPr sz="2900" b="1"/>
+            <a:lvl3pPr marL="1173490" indent="0">
+              <a:buNone/>
+              <a:defRPr sz="2300" b="1"/>
             </a:lvl3pPr>
-            <a:lvl4pPr marL="2263083" indent="0">
-              <a:buNone/>
-              <a:defRPr sz="2700" b="1"/>
+            <a:lvl4pPr marL="1760235" indent="0">
+              <a:buNone/>
+              <a:defRPr sz="2100" b="1"/>
             </a:lvl4pPr>
-            <a:lvl5pPr marL="3017445" indent="0">
-              <a:buNone/>
-              <a:defRPr sz="2700" b="1"/>
+            <a:lvl5pPr marL="2346982" indent="0">
+              <a:buNone/>
+              <a:defRPr sz="2100" b="1"/>
             </a:lvl5pPr>
-            <a:lvl6pPr marL="3771806" indent="0">
-              <a:buNone/>
-              <a:defRPr sz="2700" b="1"/>
+            <a:lvl6pPr marL="2933727" indent="0">
+              <a:buNone/>
+              <a:defRPr sz="2100" b="1"/>
             </a:lvl6pPr>
-            <a:lvl7pPr marL="4526167" indent="0">
-              <a:buNone/>
-              <a:defRPr sz="2700" b="1"/>
+            <a:lvl7pPr marL="3520472" indent="0">
+              <a:buNone/>
+              <a:defRPr sz="2100" b="1"/>
             </a:lvl7pPr>
-            <a:lvl8pPr marL="5280528" indent="0">
-              <a:buNone/>
-              <a:defRPr sz="2700" b="1"/>
+            <a:lvl8pPr marL="4107218" indent="0">
+              <a:buNone/>
+              <a:defRPr sz="2100" b="1"/>
             </a:lvl8pPr>
-            <a:lvl9pPr marL="6034889" indent="0">
-              <a:buNone/>
-              <a:defRPr sz="2700" b="1"/>
+            <a:lvl9pPr marL="4693962" indent="0">
+              <a:buNone/>
+              <a:defRPr sz="2100" b="1"/>
             </a:lvl9pPr>
           </a:lstStyle>
           <a:p>
@@ -2083,8 +2083,8 @@
         </p:nvSpPr>
         <p:spPr>
           <a:xfrm>
-            <a:off x="9046132" y="1545793"/>
-            <a:ext cx="6618426" cy="980123"/>
+            <a:off x="7148449" y="1177942"/>
+            <a:ext cx="5230022" cy="746884"/>
           </a:xfrm>
         </p:spPr>
         <p:txBody>
@@ -2094,39 +2094,39 @@
           <a:lstStyle>
             <a:lvl1pPr marL="0" indent="0">
               <a:buNone/>
-              <a:defRPr sz="2900" b="1"/>
+              <a:defRPr sz="2300" b="1"/>
             </a:lvl1pPr>
-            <a:lvl2pPr marL="754361" indent="0">
-              <a:buNone/>
-              <a:defRPr sz="3300" b="1"/>
+            <a:lvl2pPr marL="586745" indent="0">
+              <a:buNone/>
+              <a:defRPr sz="2500" b="1"/>
             </a:lvl2pPr>
-            <a:lvl3pPr marL="1508722" indent="0">
-              <a:buNone/>
-              <a:defRPr sz="2900" b="1"/>
+            <a:lvl3pPr marL="1173490" indent="0">
+              <a:buNone/>
+              <a:defRPr sz="2300" b="1"/>
             </a:lvl3pPr>
-            <a:lvl4pPr marL="2263083" indent="0">
-              <a:buNone/>
-              <a:defRPr sz="2700" b="1"/>
+            <a:lvl4pPr marL="1760235" indent="0">
+              <a:buNone/>
+              <a:defRPr sz="2100" b="1"/>
             </a:lvl4pPr>
-            <a:lvl5pPr marL="3017445" indent="0">
-              <a:buNone/>
-              <a:defRPr sz="2700" b="1"/>
+            <a:lvl5pPr marL="2346982" indent="0">
+              <a:buNone/>
+              <a:defRPr sz="2100" b="1"/>
             </a:lvl5pPr>
-            <a:lvl6pPr marL="3771806" indent="0">
-              <a:buNone/>
-              <a:defRPr sz="2700" b="1"/>
+            <a:lvl6pPr marL="2933727" indent="0">
+              <a:buNone/>
+              <a:defRPr sz="2100" b="1"/>
             </a:lvl6pPr>
-            <a:lvl7pPr marL="4526167" indent="0">
-              <a:buNone/>
-              <a:defRPr sz="2700" b="1"/>
+            <a:lvl7pPr marL="3520472" indent="0">
+              <a:buNone/>
+              <a:defRPr sz="2100" b="1"/>
             </a:lvl7pPr>
-            <a:lvl8pPr marL="5280528" indent="0">
-              <a:buNone/>
-              <a:defRPr sz="2700" b="1"/>
+            <a:lvl8pPr marL="4107218" indent="0">
+              <a:buNone/>
+              <a:defRPr sz="2100" b="1"/>
             </a:lvl8pPr>
-            <a:lvl9pPr marL="6034889" indent="0">
-              <a:buNone/>
-              <a:defRPr sz="2700" b="1"/>
+            <a:lvl9pPr marL="4693962" indent="0">
+              <a:buNone/>
+              <a:defRPr sz="2100" b="1"/>
             </a:lvl9pPr>
           </a:lstStyle>
           <a:p>
@@ -2217,8 +2217,8 @@
         </p:nvSpPr>
         <p:spPr>
           <a:xfrm>
-            <a:off x="2154869" y="2537118"/>
-            <a:ext cx="6610427" cy="7056882"/>
+            <a:off x="1702825" y="1933362"/>
+            <a:ext cx="5223701" cy="5377561"/>
           </a:xfrm>
         </p:spPr>
         <p:txBody>
@@ -2274,8 +2274,8 @@
         </p:nvSpPr>
         <p:spPr>
           <a:xfrm>
-            <a:off x="9040731" y="2537115"/>
-            <a:ext cx="6610427" cy="7056882"/>
+            <a:off x="7144181" y="1933360"/>
+            <a:ext cx="5223701" cy="5377561"/>
           </a:xfrm>
         </p:spPr>
         <p:txBody>
@@ -2588,15 +2588,15 @@
         </p:nvSpPr>
         <p:spPr>
           <a:xfrm>
-            <a:off x="10126267" y="726342"/>
-            <a:ext cx="5330355" cy="2135267"/>
+            <a:off x="8001994" y="553495"/>
+            <a:ext cx="4212161" cy="1627139"/>
           </a:xfrm>
         </p:spPr>
         <p:txBody>
           <a:bodyPr anchor="b"/>
           <a:lstStyle>
             <a:lvl1pPr algn="l">
-              <a:defRPr sz="3300" b="1">
+              <a:defRPr sz="2500" b="1">
                 <a:ln>
                   <a:noFill/>
                 </a:ln>
@@ -2628,8 +2628,8 @@
         </p:nvSpPr>
         <p:spPr>
           <a:xfrm>
-            <a:off x="10126267" y="2861608"/>
-            <a:ext cx="5330355" cy="8059758"/>
+            <a:off x="8001994" y="2180634"/>
+            <a:ext cx="4212161" cy="6141784"/>
           </a:xfrm>
         </p:spPr>
         <p:txBody>
@@ -2637,7 +2637,7 @@
           <a:lstStyle>
             <a:lvl1pPr marL="0" indent="0">
               <a:buNone/>
-              <a:defRPr sz="2300">
+              <a:defRPr sz="1700">
                 <a:solidFill>
                   <a:schemeClr val="tx1">
                     <a:lumMod val="50000"/>
@@ -2646,37 +2646,37 @@
                 </a:solidFill>
               </a:defRPr>
             </a:lvl1pPr>
-            <a:lvl2pPr marL="754361" indent="0">
-              <a:buNone/>
-              <a:defRPr sz="2000"/>
+            <a:lvl2pPr marL="586745" indent="0">
+              <a:buNone/>
+              <a:defRPr sz="1600"/>
             </a:lvl2pPr>
-            <a:lvl3pPr marL="1508722" indent="0">
-              <a:buNone/>
-              <a:defRPr sz="1600"/>
+            <a:lvl3pPr marL="1173490" indent="0">
+              <a:buNone/>
+              <a:defRPr sz="1200"/>
             </a:lvl3pPr>
-            <a:lvl4pPr marL="2263083" indent="0">
-              <a:buNone/>
-              <a:defRPr sz="1500"/>
+            <a:lvl4pPr marL="1760235" indent="0">
+              <a:buNone/>
+              <a:defRPr sz="1200"/>
             </a:lvl4pPr>
-            <a:lvl5pPr marL="3017445" indent="0">
-              <a:buNone/>
-              <a:defRPr sz="1500"/>
+            <a:lvl5pPr marL="2346982" indent="0">
+              <a:buNone/>
+              <a:defRPr sz="1200"/>
             </a:lvl5pPr>
-            <a:lvl6pPr marL="3771806" indent="0">
-              <a:buNone/>
-              <a:defRPr sz="1500"/>
+            <a:lvl6pPr marL="2933727" indent="0">
+              <a:buNone/>
+              <a:defRPr sz="1200"/>
             </a:lvl6pPr>
-            <a:lvl7pPr marL="4526167" indent="0">
-              <a:buNone/>
-              <a:defRPr sz="1500"/>
+            <a:lvl7pPr marL="3520472" indent="0">
+              <a:buNone/>
+              <a:defRPr sz="1200"/>
             </a:lvl7pPr>
-            <a:lvl8pPr marL="5280528" indent="0">
-              <a:buNone/>
-              <a:defRPr sz="1500"/>
+            <a:lvl8pPr marL="4107218" indent="0">
+              <a:buNone/>
+              <a:defRPr sz="1200"/>
             </a:lvl8pPr>
-            <a:lvl9pPr marL="6034889" indent="0">
-              <a:buNone/>
-              <a:defRPr sz="1500"/>
+            <a:lvl9pPr marL="4693962" indent="0">
+              <a:buNone/>
+              <a:defRPr sz="1200"/>
             </a:lvl9pPr>
           </a:lstStyle>
           <a:p>
@@ -2700,8 +2700,8 @@
         </p:nvSpPr>
         <p:spPr>
           <a:xfrm>
-            <a:off x="1620204" y="700090"/>
-            <a:ext cx="8506063" cy="10921365"/>
+            <a:off x="1280320" y="533491"/>
+            <a:ext cx="6721674" cy="8322416"/>
           </a:xfrm>
         </p:spPr>
         <p:txBody>
@@ -2856,15 +2856,15 @@
         </p:nvSpPr>
         <p:spPr>
           <a:xfrm>
-            <a:off x="2160271" y="8497988"/>
-            <a:ext cx="9721215" cy="743169"/>
+            <a:off x="1707093" y="6475730"/>
+            <a:ext cx="7681913" cy="566318"/>
           </a:xfrm>
         </p:spPr>
         <p:txBody>
           <a:bodyPr bIns="0" anchor="b"/>
           <a:lstStyle>
             <a:lvl1pPr algn="l">
-              <a:defRPr sz="3300" b="1">
+              <a:defRPr sz="2500" b="1">
                 <a:ln w="12700">
                   <a:noFill/>
                 </a:ln>
@@ -2896,8 +2896,8 @@
         </p:nvSpPr>
         <p:spPr>
           <a:xfrm>
-            <a:off x="2345919" y="700089"/>
-            <a:ext cx="10396299" cy="7499687"/>
+            <a:off x="1853796" y="533490"/>
+            <a:ext cx="8215379" cy="5714992"/>
           </a:xfrm>
         </p:spPr>
         <p:txBody>
@@ -2905,39 +2905,39 @@
           <a:lstStyle>
             <a:lvl1pPr marL="0" indent="0">
               <a:buNone/>
-              <a:defRPr sz="5300"/>
+              <a:defRPr sz="4100"/>
             </a:lvl1pPr>
-            <a:lvl2pPr marL="754361" indent="0">
-              <a:buNone/>
-              <a:defRPr sz="4700"/>
+            <a:lvl2pPr marL="586745" indent="0">
+              <a:buNone/>
+              <a:defRPr sz="3600"/>
             </a:lvl2pPr>
-            <a:lvl3pPr marL="1508722" indent="0">
-              <a:buNone/>
-              <a:defRPr sz="4000"/>
+            <a:lvl3pPr marL="1173490" indent="0">
+              <a:buNone/>
+              <a:defRPr sz="3100"/>
             </a:lvl3pPr>
-            <a:lvl4pPr marL="2263083" indent="0">
-              <a:buNone/>
-              <a:defRPr sz="3300"/>
+            <a:lvl4pPr marL="1760235" indent="0">
+              <a:buNone/>
+              <a:defRPr sz="2500"/>
             </a:lvl4pPr>
-            <a:lvl5pPr marL="3017445" indent="0">
-              <a:buNone/>
-              <a:defRPr sz="3300"/>
+            <a:lvl5pPr marL="2346982" indent="0">
+              <a:buNone/>
+              <a:defRPr sz="2500"/>
             </a:lvl5pPr>
-            <a:lvl6pPr marL="3771806" indent="0">
-              <a:buNone/>
-              <a:defRPr sz="3300"/>
+            <a:lvl6pPr marL="2933727" indent="0">
+              <a:buNone/>
+              <a:defRPr sz="2500"/>
             </a:lvl6pPr>
-            <a:lvl7pPr marL="4526167" indent="0">
-              <a:buNone/>
-              <a:defRPr sz="3300"/>
+            <a:lvl7pPr marL="3520472" indent="0">
+              <a:buNone/>
+              <a:defRPr sz="2500"/>
             </a:lvl7pPr>
-            <a:lvl8pPr marL="5280528" indent="0">
-              <a:buNone/>
-              <a:defRPr sz="3300"/>
+            <a:lvl8pPr marL="4107218" indent="0">
+              <a:buNone/>
+              <a:defRPr sz="2500"/>
             </a:lvl8pPr>
-            <a:lvl9pPr marL="6034889" indent="0">
-              <a:buNone/>
-              <a:defRPr sz="3300"/>
+            <a:lvl9pPr marL="4693962" indent="0">
+              <a:buNone/>
+              <a:defRPr sz="2500"/>
             </a:lvl9pPr>
           </a:lstStyle>
           <a:p>
@@ -2961,8 +2961,8 @@
         </p:nvSpPr>
         <p:spPr>
           <a:xfrm>
-            <a:off x="2160270" y="9241157"/>
-            <a:ext cx="7155894" cy="2520315"/>
+            <a:off x="1707092" y="7042045"/>
+            <a:ext cx="5654741" cy="1920558"/>
           </a:xfrm>
         </p:spPr>
         <p:txBody>
@@ -2970,43 +2970,43 @@
           <a:lstStyle>
             <a:lvl1pPr marL="0" indent="0">
               <a:buNone/>
-              <a:defRPr sz="2300">
+              <a:defRPr sz="1700">
                 <a:solidFill>
                   <a:schemeClr val="tx1"/>
                 </a:solidFill>
               </a:defRPr>
             </a:lvl1pPr>
-            <a:lvl2pPr marL="754361" indent="0">
-              <a:buNone/>
-              <a:defRPr sz="2000"/>
+            <a:lvl2pPr marL="586745" indent="0">
+              <a:buNone/>
+              <a:defRPr sz="1600"/>
             </a:lvl2pPr>
-            <a:lvl3pPr marL="1508722" indent="0">
-              <a:buNone/>
-              <a:defRPr sz="1600"/>
+            <a:lvl3pPr marL="1173490" indent="0">
+              <a:buNone/>
+              <a:defRPr sz="1200"/>
             </a:lvl3pPr>
-            <a:lvl4pPr marL="2263083" indent="0">
-              <a:buNone/>
-              <a:defRPr sz="1500"/>
+            <a:lvl4pPr marL="1760235" indent="0">
+              <a:buNone/>
+              <a:defRPr sz="1200"/>
             </a:lvl4pPr>
-            <a:lvl5pPr marL="3017445" indent="0">
-              <a:buNone/>
-              <a:defRPr sz="1500"/>
+            <a:lvl5pPr marL="2346982" indent="0">
+              <a:buNone/>
+              <a:defRPr sz="1200"/>
             </a:lvl5pPr>
-            <a:lvl6pPr marL="3771806" indent="0">
-              <a:buNone/>
-              <a:defRPr sz="1500"/>
+            <a:lvl6pPr marL="2933727" indent="0">
+              <a:buNone/>
+              <a:defRPr sz="1200"/>
             </a:lvl6pPr>
-            <a:lvl7pPr marL="4526167" indent="0">
-              <a:buNone/>
-              <a:defRPr sz="1500"/>
+            <a:lvl7pPr marL="3520472" indent="0">
+              <a:buNone/>
+              <a:defRPr sz="1200"/>
             </a:lvl7pPr>
-            <a:lvl8pPr marL="5280528" indent="0">
-              <a:buNone/>
-              <a:defRPr sz="1500"/>
+            <a:lvl8pPr marL="4107218" indent="0">
+              <a:buNone/>
+              <a:defRPr sz="1200"/>
             </a:lvl8pPr>
-            <a:lvl9pPr marL="6034889" indent="0">
-              <a:buNone/>
-              <a:defRPr sz="1500"/>
+            <a:lvl9pPr marL="4693962" indent="0">
+              <a:buNone/>
+              <a:defRPr sz="1200"/>
             </a:lvl9pPr>
           </a:lstStyle>
           <a:p>
@@ -3130,8 +3130,8 @@
         </p:nvSpPr>
         <p:spPr>
           <a:xfrm>
-            <a:off x="0" y="2"/>
-            <a:ext cx="405051" cy="12601575"/>
+            <a:off x="0" y="1"/>
+            <a:ext cx="320080" cy="9602788"/>
           </a:xfrm>
           <a:prstGeom prst="rect">
             <a:avLst/>
@@ -3182,7 +3182,7 @@
           </a:fontRef>
         </p:style>
         <p:txBody>
-          <a:bodyPr lIns="150872" tIns="75437" rIns="150872" bIns="75437" rtlCol="0" anchor="ctr"/>
+          <a:bodyPr lIns="117350" tIns="58675" rIns="117350" bIns="58675" rtlCol="0" anchor="ctr"/>
           <a:lstStyle/>
           <a:p>
             <a:pPr algn="ctr"/>
@@ -3206,8 +3206,8 @@
         </p:nvSpPr>
         <p:spPr>
           <a:xfrm>
-            <a:off x="0" y="2"/>
-            <a:ext cx="405051" cy="12601575"/>
+            <a:off x="0" y="1"/>
+            <a:ext cx="320080" cy="9602788"/>
           </a:xfrm>
           <a:prstGeom prst="rect">
             <a:avLst/>
@@ -3259,7 +3259,7 @@
           </a:fontRef>
         </p:style>
         <p:txBody>
-          <a:bodyPr lIns="150872" tIns="75437" rIns="150872" bIns="75437" rtlCol="0" anchor="ctr"/>
+          <a:bodyPr lIns="117350" tIns="58675" rIns="117350" bIns="58675" rtlCol="0" anchor="ctr"/>
           <a:lstStyle/>
           <a:p>
             <a:pPr algn="ctr"/>
@@ -3287,15 +3287,15 @@
         </p:nvSpPr>
         <p:spPr>
           <a:xfrm>
-            <a:off x="2160272" y="9661207"/>
-            <a:ext cx="12826603" cy="2100263"/>
+            <a:off x="1707093" y="7362137"/>
+            <a:ext cx="10135857" cy="1600465"/>
           </a:xfrm>
           <a:prstGeom prst="rect">
             <a:avLst/>
           </a:prstGeom>
         </p:spPr>
         <p:txBody>
-          <a:bodyPr vert="horz" lIns="150872" tIns="75437" rIns="150872" bIns="75437" rtlCol="0" anchor="b">
+          <a:bodyPr vert="horz" lIns="117350" tIns="58675" rIns="117350" bIns="58675" rtlCol="0" anchor="b">
             <a:noAutofit/>
           </a:bodyPr>
           <a:lstStyle/>
@@ -3316,15 +3316,15 @@
         </p:nvSpPr>
         <p:spPr>
           <a:xfrm>
-            <a:off x="2160272" y="1540195"/>
-            <a:ext cx="13231655" cy="8121015"/>
+            <a:off x="1707094" y="1173677"/>
+            <a:ext cx="10455938" cy="6188463"/>
           </a:xfrm>
           <a:prstGeom prst="rect">
             <a:avLst/>
           </a:prstGeom>
         </p:spPr>
         <p:txBody>
-          <a:bodyPr vert="horz" lIns="150872" tIns="75437" rIns="150872" bIns="75437" rtlCol="0">
+          <a:bodyPr vert="horz" lIns="117350" tIns="58675" rIns="117350" bIns="58675" rtlCol="0">
             <a:normAutofit/>
           </a:bodyPr>
           <a:lstStyle/>
@@ -3378,18 +3378,18 @@
         </p:nvSpPr>
         <p:spPr>
           <a:xfrm>
-            <a:off x="2231996" y="12041505"/>
-            <a:ext cx="12691587" cy="420053"/>
+            <a:off x="1763772" y="9175997"/>
+            <a:ext cx="10029164" cy="320093"/>
           </a:xfrm>
           <a:prstGeom prst="rect">
             <a:avLst/>
           </a:prstGeom>
         </p:spPr>
         <p:txBody>
-          <a:bodyPr vert="horz" lIns="150872" tIns="75437" rIns="150872" bIns="75437" rtlCol="0" anchor="ctr"/>
+          <a:bodyPr vert="horz" lIns="117350" tIns="58675" rIns="117350" bIns="58675" rtlCol="0" anchor="ctr"/>
           <a:lstStyle>
             <a:lvl1pPr algn="l">
-              <a:defRPr sz="2000">
+              <a:defRPr sz="1600">
                 <a:solidFill>
                   <a:schemeClr val="tx1">
                     <a:lumMod val="60000"/>
@@ -3416,18 +3416,18 @@
         </p:nvSpPr>
         <p:spPr>
           <a:xfrm>
-            <a:off x="15391925" y="10547987"/>
-            <a:ext cx="675084" cy="670918"/>
+            <a:off x="12163030" y="8037891"/>
+            <a:ext cx="533466" cy="511260"/>
           </a:xfrm>
           <a:prstGeom prst="rect">
             <a:avLst/>
           </a:prstGeom>
         </p:spPr>
         <p:txBody>
-          <a:bodyPr vert="horz" lIns="150872" tIns="75437" rIns="150872" bIns="75437" rtlCol="0" anchor="ctr"/>
+          <a:bodyPr vert="horz" lIns="117350" tIns="58675" rIns="117350" bIns="58675" rtlCol="0" anchor="ctr"/>
           <a:lstStyle>
             <a:lvl1pPr algn="l">
-              <a:defRPr sz="2000" b="0">
+              <a:defRPr sz="1600" b="0">
                 <a:solidFill>
                   <a:schemeClr val="tx2">
                     <a:lumMod val="60000"/>
@@ -3457,8 +3457,8 @@
         </p:nvSpPr>
         <p:spPr bwMode="auto">
           <a:xfrm>
-            <a:off x="14978436" y="10501312"/>
-            <a:ext cx="430365" cy="793433"/>
+            <a:off x="11836284" y="8002323"/>
+            <a:ext cx="340083" cy="604620"/>
           </a:xfrm>
           <a:custGeom>
             <a:avLst/>
@@ -3535,7 +3535,7 @@
           </a:ln>
         </p:spPr>
         <p:txBody>
-          <a:bodyPr vert="horz" wrap="square" lIns="150872" tIns="75437" rIns="150872" bIns="75437" numCol="1" anchor="t" anchorCtr="0" compatLnSpc="1">
+          <a:bodyPr vert="horz" wrap="square" lIns="117350" tIns="58675" rIns="117350" bIns="58675" numCol="1" anchor="t" anchorCtr="0" compatLnSpc="1">
             <a:prstTxWarp prst="textNoShape">
               <a:avLst/>
             </a:prstTxWarp>
@@ -3558,18 +3558,18 @@
         </p:nvSpPr>
         <p:spPr>
           <a:xfrm rot="16200000">
-            <a:off x="-2210079" y="8866302"/>
-            <a:ext cx="4825218" cy="405051"/>
+            <a:off x="-1678439" y="6750687"/>
+            <a:ext cx="3676965" cy="320080"/>
           </a:xfrm>
           <a:prstGeom prst="rect">
             <a:avLst/>
           </a:prstGeom>
         </p:spPr>
         <p:txBody>
-          <a:bodyPr vert="horz" lIns="150872" tIns="75437" rIns="150872" bIns="75437" rtlCol="0" anchor="ctr"/>
+          <a:bodyPr vert="horz" lIns="117350" tIns="58675" rIns="117350" bIns="58675" rtlCol="0" anchor="ctr"/>
           <a:lstStyle>
             <a:lvl1pPr algn="l">
-              <a:defRPr sz="2000">
+              <a:defRPr sz="1600">
                 <a:solidFill>
                   <a:srgbClr val="FFFFFF"/>
                 </a:solidFill>
@@ -3738,12 +3738,12 @@
   </p:timing>
   <p:txStyles>
     <p:titleStyle>
-      <a:lvl1pPr algn="l" defTabSz="1508722" rtl="0" eaLnBrk="1" latinLnBrk="0" hangingPunct="1">
+      <a:lvl1pPr algn="l" defTabSz="1173490" rtl="0" eaLnBrk="1" latinLnBrk="0" hangingPunct="1">
         <a:spcBef>
           <a:spcPct val="0"/>
         </a:spcBef>
         <a:buNone/>
-        <a:defRPr sz="11900" b="1" kern="1200">
+        <a:defRPr sz="9200" b="1" kern="1200">
           <a:ln w="12700">
             <a:solidFill>
               <a:schemeClr val="tx2"/>
@@ -3766,13 +3766,13 @@
       </a:lvl1pPr>
     </p:titleStyle>
     <p:bodyStyle>
-      <a:lvl1pPr marL="565771" indent="-565771" algn="l" defTabSz="1508722" rtl="0" eaLnBrk="1" latinLnBrk="0" hangingPunct="1">
+      <a:lvl1pPr marL="440060" indent="-440060" algn="l" defTabSz="1173490" rtl="0" eaLnBrk="1" latinLnBrk="0" hangingPunct="1">
         <a:spcBef>
           <a:spcPct val="20000"/>
         </a:spcBef>
         <a:buFont typeface="Arial" pitchFamily="34" charset="0"/>
         <a:buChar char="»"/>
-        <a:defRPr sz="4700" kern="1200">
+        <a:defRPr sz="3600" kern="1200">
           <a:solidFill>
             <a:schemeClr val="tx2"/>
           </a:solidFill>
@@ -3781,13 +3781,13 @@
           <a:cs typeface="+mn-cs"/>
         </a:defRPr>
       </a:lvl1pPr>
-      <a:lvl2pPr marL="1225837" indent="-471476" algn="l" defTabSz="1508722" rtl="0" eaLnBrk="1" latinLnBrk="0" hangingPunct="1">
+      <a:lvl2pPr marL="953461" indent="-366716" algn="l" defTabSz="1173490" rtl="0" eaLnBrk="1" latinLnBrk="0" hangingPunct="1">
         <a:spcBef>
           <a:spcPct val="20000"/>
         </a:spcBef>
         <a:buFont typeface="Arial" pitchFamily="34" charset="0"/>
         <a:buChar char="˃"/>
-        <a:defRPr sz="2900" kern="1200">
+        <a:defRPr sz="2300" kern="1200">
           <a:solidFill>
             <a:schemeClr val="tx1"/>
           </a:solidFill>
@@ -3796,13 +3796,13 @@
           <a:cs typeface="+mn-cs"/>
         </a:defRPr>
       </a:lvl2pPr>
-      <a:lvl3pPr marL="1885904" indent="-377181" algn="l" defTabSz="1508722" rtl="0" eaLnBrk="1" latinLnBrk="0" hangingPunct="1">
+      <a:lvl3pPr marL="1466865" indent="-293372" algn="l" defTabSz="1173490" rtl="0" eaLnBrk="1" latinLnBrk="0" hangingPunct="1">
         <a:spcBef>
           <a:spcPct val="20000"/>
         </a:spcBef>
         <a:buFont typeface="Calibri" pitchFamily="34" charset="0"/>
         <a:buChar char="+"/>
-        <a:defRPr sz="2900" kern="1200">
+        <a:defRPr sz="2300" kern="1200">
           <a:solidFill>
             <a:schemeClr val="tx1"/>
           </a:solidFill>
@@ -3811,13 +3811,13 @@
           <a:cs typeface="+mn-cs"/>
         </a:defRPr>
       </a:lvl3pPr>
-      <a:lvl4pPr marL="2640265" indent="-377181" algn="l" defTabSz="1508722" rtl="0" eaLnBrk="1" latinLnBrk="0" hangingPunct="1">
+      <a:lvl4pPr marL="2053609" indent="-293372" algn="l" defTabSz="1173490" rtl="0" eaLnBrk="1" latinLnBrk="0" hangingPunct="1">
         <a:spcBef>
           <a:spcPct val="20000"/>
         </a:spcBef>
         <a:buFont typeface="Arial" pitchFamily="34" charset="0"/>
         <a:buChar char="–"/>
-        <a:defRPr sz="2900" kern="1200">
+        <a:defRPr sz="2300" kern="1200">
           <a:solidFill>
             <a:schemeClr val="tx1"/>
           </a:solidFill>
@@ -3826,13 +3826,13 @@
           <a:cs typeface="+mn-cs"/>
         </a:defRPr>
       </a:lvl4pPr>
-      <a:lvl5pPr marL="3394626" indent="-377181" algn="l" defTabSz="1508722" rtl="0" eaLnBrk="1" latinLnBrk="0" hangingPunct="1">
+      <a:lvl5pPr marL="2640354" indent="-293372" algn="l" defTabSz="1173490" rtl="0" eaLnBrk="1" latinLnBrk="0" hangingPunct="1">
         <a:spcBef>
           <a:spcPct val="20000"/>
         </a:spcBef>
         <a:buFont typeface="Arial" pitchFamily="34" charset="0"/>
         <a:buChar char="»"/>
-        <a:defRPr sz="2900" kern="1200">
+        <a:defRPr sz="2300" kern="1200">
           <a:solidFill>
             <a:schemeClr val="tx1"/>
           </a:solidFill>
@@ -3841,7 +3841,7 @@
           <a:cs typeface="+mn-cs"/>
         </a:defRPr>
       </a:lvl5pPr>
-      <a:lvl6pPr marL="4148987" indent="-377181" algn="l" defTabSz="1508722" rtl="0" eaLnBrk="1" latinLnBrk="0" hangingPunct="1">
+      <a:lvl6pPr marL="3227100" indent="-293372" algn="l" defTabSz="1173490" rtl="0" eaLnBrk="1" latinLnBrk="0" hangingPunct="1">
         <a:spcBef>
           <a:spcPct val="20000"/>
         </a:spcBef>
@@ -3850,7 +3850,7 @@
         </a:buClr>
         <a:buFont typeface="Calibri" pitchFamily="34" charset="0"/>
         <a:buChar char="&gt;"/>
-        <a:defRPr sz="2900" kern="1200">
+        <a:defRPr sz="2300" kern="1200">
           <a:solidFill>
             <a:schemeClr val="tx1"/>
           </a:solidFill>
@@ -3859,13 +3859,13 @@
           <a:cs typeface="+mn-cs"/>
         </a:defRPr>
       </a:lvl6pPr>
-      <a:lvl7pPr marL="4903348" indent="-377181" algn="l" defTabSz="1508722" rtl="0" eaLnBrk="1" latinLnBrk="0" hangingPunct="1">
+      <a:lvl7pPr marL="3813846" indent="-293372" algn="l" defTabSz="1173490" rtl="0" eaLnBrk="1" latinLnBrk="0" hangingPunct="1">
         <a:spcBef>
           <a:spcPct val="20000"/>
         </a:spcBef>
         <a:buFont typeface="Calibri" pitchFamily="34" charset="0"/>
         <a:buChar char="+"/>
-        <a:defRPr sz="2900" kern="1200">
+        <a:defRPr sz="2300" kern="1200">
           <a:solidFill>
             <a:schemeClr val="tx1"/>
           </a:solidFill>
@@ -3874,7 +3874,7 @@
           <a:cs typeface="+mn-cs"/>
         </a:defRPr>
       </a:lvl7pPr>
-      <a:lvl8pPr marL="5657709" indent="-377181" algn="l" defTabSz="1508722" rtl="0" eaLnBrk="1" latinLnBrk="0" hangingPunct="1">
+      <a:lvl8pPr marL="4400591" indent="-293372" algn="l" defTabSz="1173490" rtl="0" eaLnBrk="1" latinLnBrk="0" hangingPunct="1">
         <a:spcBef>
           <a:spcPct val="20000"/>
         </a:spcBef>
@@ -3883,7 +3883,7 @@
         </a:buClr>
         <a:buFont typeface="Calibri" pitchFamily="34" charset="0"/>
         <a:buChar char="»"/>
-        <a:defRPr sz="2900" kern="1200">
+        <a:defRPr sz="2300" kern="1200">
           <a:solidFill>
             <a:schemeClr val="tx1"/>
           </a:solidFill>
@@ -3892,7 +3892,7 @@
           <a:cs typeface="+mn-cs"/>
         </a:defRPr>
       </a:lvl8pPr>
-      <a:lvl9pPr marL="6412070" indent="-377181" algn="l" defTabSz="1508722" rtl="0" eaLnBrk="1" latinLnBrk="0" hangingPunct="1">
+      <a:lvl9pPr marL="4987337" indent="-293372" algn="l" defTabSz="1173490" rtl="0" eaLnBrk="1" latinLnBrk="0" hangingPunct="1">
         <a:spcBef>
           <a:spcPct val="20000"/>
         </a:spcBef>
@@ -3901,7 +3901,7 @@
         </a:buClr>
         <a:buFont typeface="Calibri" pitchFamily="34" charset="0"/>
         <a:buChar char="−"/>
-        <a:defRPr sz="2900" kern="1200">
+        <a:defRPr sz="2300" kern="1200">
           <a:solidFill>
             <a:schemeClr val="tx1"/>
           </a:solidFill>
@@ -3915,8 +3915,8 @@
       <a:defPPr>
         <a:defRPr lang="en-US"/>
       </a:defPPr>
-      <a:lvl1pPr marL="0" algn="l" defTabSz="1508722" rtl="0" eaLnBrk="1" latinLnBrk="0" hangingPunct="1">
-        <a:defRPr sz="2900" kern="1200">
+      <a:lvl1pPr marL="0" algn="l" defTabSz="1173490" rtl="0" eaLnBrk="1" latinLnBrk="0" hangingPunct="1">
+        <a:defRPr sz="2300" kern="1200">
           <a:solidFill>
             <a:schemeClr val="tx1"/>
           </a:solidFill>
@@ -3925,8 +3925,8 @@
           <a:cs typeface="+mn-cs"/>
         </a:defRPr>
       </a:lvl1pPr>
-      <a:lvl2pPr marL="754361" algn="l" defTabSz="1508722" rtl="0" eaLnBrk="1" latinLnBrk="0" hangingPunct="1">
-        <a:defRPr sz="2900" kern="1200">
+      <a:lvl2pPr marL="586745" algn="l" defTabSz="1173490" rtl="0" eaLnBrk="1" latinLnBrk="0" hangingPunct="1">
+        <a:defRPr sz="2300" kern="1200">
           <a:solidFill>
             <a:schemeClr val="tx1"/>
           </a:solidFill>
@@ -3935,8 +3935,8 @@
           <a:cs typeface="+mn-cs"/>
         </a:defRPr>
       </a:lvl2pPr>
-      <a:lvl3pPr marL="1508722" algn="l" defTabSz="1508722" rtl="0" eaLnBrk="1" latinLnBrk="0" hangingPunct="1">
-        <a:defRPr sz="2900" kern="1200">
+      <a:lvl3pPr marL="1173490" algn="l" defTabSz="1173490" rtl="0" eaLnBrk="1" latinLnBrk="0" hangingPunct="1">
+        <a:defRPr sz="2300" kern="1200">
           <a:solidFill>
             <a:schemeClr val="tx1"/>
           </a:solidFill>
@@ -3945,8 +3945,8 @@
           <a:cs typeface="+mn-cs"/>
         </a:defRPr>
       </a:lvl3pPr>
-      <a:lvl4pPr marL="2263083" algn="l" defTabSz="1508722" rtl="0" eaLnBrk="1" latinLnBrk="0" hangingPunct="1">
-        <a:defRPr sz="2900" kern="1200">
+      <a:lvl4pPr marL="1760235" algn="l" defTabSz="1173490" rtl="0" eaLnBrk="1" latinLnBrk="0" hangingPunct="1">
+        <a:defRPr sz="2300" kern="1200">
           <a:solidFill>
             <a:schemeClr val="tx1"/>
           </a:solidFill>
@@ -3955,8 +3955,8 @@
           <a:cs typeface="+mn-cs"/>
         </a:defRPr>
       </a:lvl4pPr>
-      <a:lvl5pPr marL="3017445" algn="l" defTabSz="1508722" rtl="0" eaLnBrk="1" latinLnBrk="0" hangingPunct="1">
-        <a:defRPr sz="2900" kern="1200">
+      <a:lvl5pPr marL="2346982" algn="l" defTabSz="1173490" rtl="0" eaLnBrk="1" latinLnBrk="0" hangingPunct="1">
+        <a:defRPr sz="2300" kern="1200">
           <a:solidFill>
             <a:schemeClr val="tx1"/>
           </a:solidFill>
@@ -3965,8 +3965,8 @@
           <a:cs typeface="+mn-cs"/>
         </a:defRPr>
       </a:lvl5pPr>
-      <a:lvl6pPr marL="3771806" algn="l" defTabSz="1508722" rtl="0" eaLnBrk="1" latinLnBrk="0" hangingPunct="1">
-        <a:defRPr sz="2900" kern="1200">
+      <a:lvl6pPr marL="2933727" algn="l" defTabSz="1173490" rtl="0" eaLnBrk="1" latinLnBrk="0" hangingPunct="1">
+        <a:defRPr sz="2300" kern="1200">
           <a:solidFill>
             <a:schemeClr val="tx1"/>
           </a:solidFill>
@@ -3975,8 +3975,8 @@
           <a:cs typeface="+mn-cs"/>
         </a:defRPr>
       </a:lvl6pPr>
-      <a:lvl7pPr marL="4526167" algn="l" defTabSz="1508722" rtl="0" eaLnBrk="1" latinLnBrk="0" hangingPunct="1">
-        <a:defRPr sz="2900" kern="1200">
+      <a:lvl7pPr marL="3520472" algn="l" defTabSz="1173490" rtl="0" eaLnBrk="1" latinLnBrk="0" hangingPunct="1">
+        <a:defRPr sz="2300" kern="1200">
           <a:solidFill>
             <a:schemeClr val="tx1"/>
           </a:solidFill>
@@ -3985,8 +3985,8 @@
           <a:cs typeface="+mn-cs"/>
         </a:defRPr>
       </a:lvl7pPr>
-      <a:lvl8pPr marL="5280528" algn="l" defTabSz="1508722" rtl="0" eaLnBrk="1" latinLnBrk="0" hangingPunct="1">
-        <a:defRPr sz="2900" kern="1200">
+      <a:lvl8pPr marL="4107218" algn="l" defTabSz="1173490" rtl="0" eaLnBrk="1" latinLnBrk="0" hangingPunct="1">
+        <a:defRPr sz="2300" kern="1200">
           <a:solidFill>
             <a:schemeClr val="tx1"/>
           </a:solidFill>
@@ -3995,8 +3995,8 @@
           <a:cs typeface="+mn-cs"/>
         </a:defRPr>
       </a:lvl8pPr>
-      <a:lvl9pPr marL="6034889" algn="l" defTabSz="1508722" rtl="0" eaLnBrk="1" latinLnBrk="0" hangingPunct="1">
-        <a:defRPr sz="2900" kern="1200">
+      <a:lvl9pPr marL="4693962" algn="l" defTabSz="1173490" rtl="0" eaLnBrk="1" latinLnBrk="0" hangingPunct="1">
+        <a:defRPr sz="2300" kern="1200">
           <a:solidFill>
             <a:schemeClr val="tx1"/>
           </a:solidFill>
@@ -4039,8 +4039,8 @@
         </p:nvSpPr>
         <p:spPr>
           <a:xfrm>
-            <a:off x="5805603" y="1663472"/>
-            <a:ext cx="4814249" cy="705678"/>
+            <a:off x="4587712" y="1267618"/>
+            <a:ext cx="3804323" cy="691391"/>
           </a:xfrm>
           <a:prstGeom prst="snip2SameRect">
             <a:avLst/>
@@ -4062,7 +4062,7 @@
         </p:style>
         <p:txBody>
           <a:bodyPr>
-            <a:normAutofit lnSpcReduction="10000"/>
+            <a:noAutofit/>
           </a:bodyPr>
           <a:lstStyle/>
           <a:p>
@@ -4070,11 +4070,32 @@
               <a:buNone/>
             </a:pPr>
             <a:r>
-              <a:rPr lang="nl-NL" sz="1500" b="1" dirty="0" smtClean="0"/>
-              <a:t>Tomas Heinsohn Huala</a:t>
-            </a:r>
-            <a:r>
-              <a:rPr lang="nl-NL" sz="1500" dirty="0" smtClean="0"/>
+              <a:rPr lang="nl-NL" sz="1100" b="1" dirty="0"/>
+              <a:t>Group 9</a:t>
+            </a:r>
+          </a:p>
+          <a:p>
+            <a:pPr marL="0" indent="0" algn="ctr">
+              <a:buNone/>
+            </a:pPr>
+            <a:r>
+              <a:rPr lang="nl-NL" sz="1100" b="1" dirty="0"/>
+              <a:t>Tomas </a:t>
+            </a:r>
+            <a:r>
+              <a:rPr lang="nl-NL" sz="1100" b="1" dirty="0" err="1"/>
+              <a:t>Heinsohn</a:t>
+            </a:r>
+            <a:r>
+              <a:rPr lang="nl-NL" sz="1100" b="1" dirty="0"/>
+              <a:t> </a:t>
+            </a:r>
+            <a:r>
+              <a:rPr lang="nl-NL" sz="1100" b="1" dirty="0" err="1"/>
+              <a:t>Huala</a:t>
+            </a:r>
+            <a:r>
+              <a:rPr lang="nl-NL" sz="1100" dirty="0"/>
               <a:t>	4326318</a:t>
             </a:r>
           </a:p>
@@ -4083,14 +4104,14 @@
               <a:buNone/>
             </a:pPr>
             <a:r>
-              <a:rPr lang="nl-NL" sz="1500" b="1" dirty="0" smtClean="0"/>
+              <a:rPr lang="nl-NL" sz="1100" b="1" dirty="0"/>
               <a:t>Remi van der Laan	</a:t>
             </a:r>
             <a:r>
-              <a:rPr lang="nl-NL" sz="1500" dirty="0" smtClean="0"/>
+              <a:rPr lang="nl-NL" sz="1100" dirty="0"/>
               <a:t>	4326156</a:t>
             </a:r>
-            <a:endParaRPr lang="nl-NL" sz="1500" dirty="0"/>
+            <a:endParaRPr lang="nl-NL" sz="1100" dirty="0"/>
           </a:p>
         </p:txBody>
       </p:sp>
@@ -4106,8 +4127,8 @@
         </p:nvSpPr>
         <p:spPr>
           <a:xfrm>
-            <a:off x="3423641" y="352926"/>
-            <a:ext cx="9578173" cy="1310546"/>
+            <a:off x="2705436" y="268942"/>
+            <a:ext cx="7568878" cy="998676"/>
           </a:xfrm>
           <a:prstGeom prst="snip2DiagRect">
             <a:avLst/>
@@ -4133,7 +4154,7 @@
           <a:p>
             <a:pPr algn="ctr"/>
             <a:r>
-              <a:rPr lang="nl-NL" sz="6400" dirty="0" err="1" smtClean="0">
+              <a:rPr lang="nl-NL" sz="4900" dirty="0" err="1">
                 <a:ln w="12700">
                   <a:solidFill>
                     <a:schemeClr val="tx2">
@@ -4161,7 +4182,7 @@
               <a:t>License</a:t>
             </a:r>
             <a:r>
-              <a:rPr lang="nl-NL" sz="6400" dirty="0" smtClean="0">
+              <a:rPr lang="nl-NL" sz="4900" dirty="0">
                 <a:ln w="12700">
                   <a:solidFill>
                     <a:schemeClr val="tx2">
@@ -4189,7 +4210,7 @@
               <a:t> </a:t>
             </a:r>
             <a:r>
-              <a:rPr lang="nl-NL" sz="6400" dirty="0" err="1" smtClean="0">
+              <a:rPr lang="nl-NL" sz="4900" dirty="0" err="1">
                 <a:ln w="12700">
                   <a:solidFill>
                     <a:schemeClr val="tx2">
@@ -4217,7 +4238,7 @@
               <a:t>Plate</a:t>
             </a:r>
             <a:r>
-              <a:rPr lang="nl-NL" sz="6400" dirty="0" smtClean="0">
+              <a:rPr lang="nl-NL" sz="4900" dirty="0">
                 <a:ln w="12700">
                   <a:solidFill>
                     <a:schemeClr val="tx2">
@@ -4245,7 +4266,7 @@
               <a:t> </a:t>
             </a:r>
             <a:r>
-              <a:rPr lang="nl-NL" sz="6400" dirty="0" err="1" smtClean="0">
+              <a:rPr lang="nl-NL" sz="4900" dirty="0" err="1">
                 <a:ln w="12700">
                   <a:solidFill>
                     <a:schemeClr val="tx2">
@@ -4272,7 +4293,7 @@
               </a:rPr>
               <a:t>Recognition</a:t>
             </a:r>
-            <a:endParaRPr lang="nl-NL" sz="6400" dirty="0">
+            <a:endParaRPr lang="nl-NL" sz="4900" dirty="0">
               <a:ln w="12700">
                 <a:solidFill>
                   <a:schemeClr val="tx2">
@@ -4312,8 +4333,8 @@
         </p:nvSpPr>
         <p:spPr>
           <a:xfrm>
-            <a:off x="694476" y="1764283"/>
-            <a:ext cx="4814249" cy="907301"/>
+            <a:off x="548790" y="1267617"/>
+            <a:ext cx="3804323" cy="691391"/>
           </a:xfrm>
         </p:spPr>
         <p:txBody>
@@ -4326,7 +4347,7 @@
               <a:buNone/>
             </a:pPr>
             <a:r>
-              <a:rPr lang="en-US" sz="4300" dirty="0" smtClean="0">
+              <a:rPr lang="en-US" sz="3300" dirty="0">
                 <a:ln w="10160">
                   <a:solidFill>
                     <a:schemeClr val="accent1"/>
@@ -4346,7 +4367,7 @@
               </a:rPr>
               <a:t>Introduction</a:t>
             </a:r>
-            <a:endParaRPr lang="nl-NL" sz="4300" dirty="0">
+            <a:endParaRPr lang="nl-NL" sz="3300" dirty="0">
               <a:ln w="10160">
                 <a:solidFill>
                   <a:schemeClr val="accent1"/>
@@ -4379,8 +4400,8 @@
         </p:nvSpPr>
         <p:spPr>
           <a:xfrm>
-            <a:off x="694476" y="2570773"/>
-            <a:ext cx="4814249" cy="2621091"/>
+            <a:off x="548789" y="1817514"/>
+            <a:ext cx="3804323" cy="1887711"/>
           </a:xfrm>
           <a:ln/>
         </p:spPr>
@@ -4400,7 +4421,7 @@
         </p:style>
         <p:txBody>
           <a:bodyPr>
-            <a:normAutofit/>
+            <a:normAutofit lnSpcReduction="10000"/>
           </a:bodyPr>
           <a:lstStyle/>
           <a:p>
@@ -4408,10 +4429,72 @@
               <a:buNone/>
             </a:pPr>
             <a:r>
-              <a:rPr lang="en-US" sz="1300" dirty="0" smtClean="0"/>
-              <a:t>These days is impossible to fill in all the cars you see by hand to find them in a car database. Therefore we thought it should be possible to make this easier with the technology and knowledge of these days. Therefore we made an application in MATLAB that is able to recognize license plates of cars and to write them down. For this application we used several image processing techniques to recognize the license plates.</a:t>
-            </a:r>
-            <a:endParaRPr lang="nl-NL" sz="1300" dirty="0"/>
+              <a:rPr lang="en-US" sz="1100" dirty="0"/>
+              <a:t>These days </a:t>
+            </a:r>
+            <a:r>
+              <a:rPr lang="en-US" sz="1100" dirty="0" smtClean="0"/>
+              <a:t>it’s </a:t>
+            </a:r>
+            <a:r>
+              <a:rPr lang="en-US" sz="1100" dirty="0"/>
+              <a:t>impossible to </a:t>
+            </a:r>
+            <a:r>
+              <a:rPr lang="en-US" sz="1100" dirty="0" smtClean="0"/>
+              <a:t>write down all license plates you see by hand to </a:t>
+            </a:r>
+            <a:r>
+              <a:rPr lang="en-US" sz="1100" dirty="0"/>
+              <a:t>find them in a car database. </a:t>
+            </a:r>
+            <a:r>
+              <a:rPr lang="en-US" sz="1100" dirty="0" smtClean="0"/>
+              <a:t>For this purpose we created this application, because we have the technology. We created this application in </a:t>
+            </a:r>
+            <a:r>
+              <a:rPr lang="en-US" sz="1100" dirty="0" err="1" smtClean="0"/>
+              <a:t>MatLab</a:t>
+            </a:r>
+            <a:r>
+              <a:rPr lang="en-US" sz="1100" dirty="0" smtClean="0"/>
+              <a:t> and it outputs all license plates it can find in a table. </a:t>
+            </a:r>
+          </a:p>
+          <a:p>
+            <a:pPr marL="0" indent="0">
+              <a:buNone/>
+            </a:pPr>
+            <a:r>
+              <a:rPr lang="en-US" sz="1100" dirty="0" smtClean="0"/>
+              <a:t>We used several image </a:t>
+            </a:r>
+            <a:r>
+              <a:rPr lang="en-US" sz="1100" dirty="0"/>
+              <a:t>processing </a:t>
+            </a:r>
+            <a:r>
+              <a:rPr lang="en-US" sz="1100" dirty="0" smtClean="0"/>
+              <a:t>techniques, such as OCR (Optical Character Recognition), segmentation and made use of other knowledge, like </a:t>
+            </a:r>
+            <a:r>
+              <a:rPr lang="en-US" sz="1100" dirty="0" err="1" smtClean="0"/>
+              <a:t>sidecodes</a:t>
+            </a:r>
+            <a:r>
+              <a:rPr lang="en-US" sz="1100" dirty="0" smtClean="0"/>
+              <a:t>, to find the best results possible. </a:t>
+            </a:r>
+          </a:p>
+          <a:p>
+            <a:pPr marL="0" indent="0">
+              <a:buNone/>
+            </a:pPr>
+            <a:r>
+              <a:rPr lang="en-US" sz="1100" dirty="0" smtClean="0"/>
+              <a:t>In this poster we will explain how our application was made and how it works and we will end it with an evaluation.</a:t>
+            </a:r>
+            <a:endParaRPr lang="nl-NL" sz="1100" dirty="0"/>
           </a:p>
         </p:txBody>
       </p:sp>
@@ -4427,8 +4510,8 @@
         </p:nvSpPr>
         <p:spPr>
           <a:xfrm>
-            <a:off x="5794824" y="3377262"/>
-            <a:ext cx="4814249" cy="7027981"/>
+            <a:off x="4579195" y="2573577"/>
+            <a:ext cx="3804323" cy="6765071"/>
           </a:xfrm>
           <a:ln/>
         </p:spPr>
@@ -4456,10 +4539,177 @@
               <a:buNone/>
             </a:pPr>
             <a:r>
-              <a:rPr lang="nl-NL" sz="1500" dirty="0" err="1" smtClean="0"/>
-              <a:t>Text</a:t>
-            </a:r>
-            <a:endParaRPr lang="nl-NL" sz="1500" dirty="0"/>
+              <a:rPr lang="en-US" sz="1200" dirty="0"/>
+              <a:t>We have implemented our character recognition algorithm as follows:</a:t>
+            </a:r>
+          </a:p>
+          <a:p>
+            <a:pPr marL="0" indent="0">
+              <a:buNone/>
+            </a:pPr>
+            <a:r>
+              <a:rPr lang="en-US" sz="1200" dirty="0" smtClean="0"/>
+              <a:t>We receive an image from the segmentation algorithm, which looks similar to this:</a:t>
+            </a:r>
+          </a:p>
+          <a:p>
+            <a:pPr marL="0" indent="0">
+              <a:buNone/>
+            </a:pPr>
+            <a:endParaRPr lang="en-US" sz="1200" dirty="0" smtClean="0"/>
+          </a:p>
+          <a:p>
+            <a:pPr marL="0" indent="0">
+              <a:buNone/>
+            </a:pPr>
+            <a:endParaRPr lang="en-US" sz="1200" dirty="0"/>
+          </a:p>
+          <a:p>
+            <a:pPr marL="0" indent="0">
+              <a:buNone/>
+            </a:pPr>
+            <a:r>
+              <a:rPr lang="en-US" sz="1200" dirty="0" smtClean="0"/>
+              <a:t>We </a:t>
+            </a:r>
+            <a:r>
+              <a:rPr lang="en-US" sz="1200" dirty="0"/>
+              <a:t>calculate the bounding box of every object and check if it could be a character judging by its </a:t>
+            </a:r>
+            <a:r>
+              <a:rPr lang="en-US" sz="1200" dirty="0" smtClean="0"/>
+              <a:t>dimensions. </a:t>
+            </a:r>
+            <a:r>
+              <a:rPr lang="en-US" sz="1200" dirty="0"/>
+              <a:t>Then we calculate the angle by comparing the width and height between the first and last character, so we can compensate the rotation if necessary.</a:t>
+            </a:r>
+          </a:p>
+          <a:p>
+            <a:pPr marL="0" indent="0">
+              <a:buNone/>
+            </a:pPr>
+            <a:r>
+              <a:rPr lang="en-US" sz="1200" dirty="0"/>
+              <a:t>For every possible character, we calculate the correlation with all of these characters:</a:t>
+            </a:r>
+          </a:p>
+          <a:p>
+            <a:pPr marL="0" indent="0">
+              <a:buNone/>
+            </a:pPr>
+            <a:endParaRPr lang="en-US" sz="1200" dirty="0"/>
+          </a:p>
+          <a:p>
+            <a:pPr marL="0" indent="0">
+              <a:buNone/>
+            </a:pPr>
+            <a:r>
+              <a:rPr lang="en-US" sz="1200" dirty="0"/>
+              <a:t>The character corresponds with the image which has the highest correlation with the object</a:t>
+            </a:r>
+            <a:r>
+              <a:rPr lang="en-US" sz="1200" dirty="0" smtClean="0"/>
+              <a:t>.</a:t>
+            </a:r>
+          </a:p>
+          <a:p>
+            <a:pPr marL="0" indent="0">
+              <a:buNone/>
+            </a:pPr>
+            <a:r>
+              <a:rPr lang="en-US" sz="1200" dirty="0" smtClean="0"/>
+              <a:t>Then </a:t>
+            </a:r>
+            <a:r>
+              <a:rPr lang="en-US" sz="1200" dirty="0"/>
+              <a:t>we find the two largest gaps between the characters, where we insert the dashes.</a:t>
+            </a:r>
+          </a:p>
+          <a:p>
+            <a:pPr marL="0" indent="0">
+              <a:buNone/>
+            </a:pPr>
+            <a:r>
+              <a:rPr lang="en-US" sz="1200" dirty="0"/>
+              <a:t>We make use of </a:t>
+            </a:r>
+            <a:r>
+              <a:rPr lang="en-US" sz="1200" dirty="0" err="1"/>
+              <a:t>sidecodes</a:t>
+            </a:r>
+            <a:r>
+              <a:rPr lang="en-US" sz="1200" dirty="0"/>
+              <a:t> to correct any falsely recognized digits and characters, like ‘B’ and ‘8’. </a:t>
+            </a:r>
+            <a:r>
+              <a:rPr lang="en-US" sz="1200" dirty="0" err="1"/>
+              <a:t>Sidecodes</a:t>
+            </a:r>
+            <a:r>
+              <a:rPr lang="en-US" sz="1200" dirty="0"/>
+              <a:t> are the order and amount of characters which could be digits or alphabetic characters, like these ones:</a:t>
+            </a:r>
+          </a:p>
+          <a:p>
+            <a:pPr marL="0" indent="0">
+              <a:buNone/>
+            </a:pPr>
+            <a:endParaRPr lang="en-US" sz="1200" dirty="0"/>
+          </a:p>
+          <a:p>
+            <a:pPr marL="0" indent="0">
+              <a:buNone/>
+            </a:pPr>
+            <a:endParaRPr lang="en-US" sz="1200" dirty="0"/>
+          </a:p>
+          <a:p>
+            <a:pPr marL="0" indent="0">
+              <a:buNone/>
+            </a:pPr>
+            <a:endParaRPr lang="en-US" sz="1200" dirty="0"/>
+          </a:p>
+          <a:p>
+            <a:pPr marL="0" indent="0">
+              <a:buNone/>
+            </a:pPr>
+            <a:endParaRPr lang="en-US" sz="1200" dirty="0"/>
+          </a:p>
+          <a:p>
+            <a:pPr marL="0" indent="0">
+              <a:buNone/>
+            </a:pPr>
+            <a:endParaRPr lang="en-US" sz="1200" dirty="0"/>
+          </a:p>
+          <a:p>
+            <a:pPr marL="0" indent="0">
+              <a:buNone/>
+            </a:pPr>
+            <a:r>
+              <a:rPr lang="en-US" sz="1200" dirty="0"/>
+              <a:t>If any of these steps fail, we stop the recognition of that frame because we won’t get an outcome which could be correct.</a:t>
+            </a:r>
+          </a:p>
+          <a:p>
+            <a:pPr marL="0" indent="0">
+              <a:buNone/>
+            </a:pPr>
+            <a:r>
+              <a:rPr lang="en-US" sz="1200" dirty="0"/>
+              <a:t>We then count which license plates are recognized and pick the one with the highest count if a new license plate is recognized. </a:t>
+            </a:r>
+          </a:p>
+          <a:p>
+            <a:pPr marL="0" indent="0">
+              <a:buNone/>
+            </a:pPr>
+            <a:endParaRPr lang="en-US" sz="1200" dirty="0"/>
+          </a:p>
+          <a:p>
+            <a:pPr marL="0" indent="0">
+              <a:buNone/>
+            </a:pPr>
+            <a:endParaRPr lang="en-US" sz="1200" dirty="0"/>
           </a:p>
         </p:txBody>
       </p:sp>
@@ -4475,8 +4725,8 @@
         </p:nvSpPr>
         <p:spPr>
           <a:xfrm>
-            <a:off x="10878463" y="1764283"/>
-            <a:ext cx="4814249" cy="864096"/>
+            <a:off x="8625721" y="1273002"/>
+            <a:ext cx="3804323" cy="658467"/>
           </a:xfrm>
         </p:spPr>
         <p:txBody>
@@ -4489,7 +4739,7 @@
               <a:buNone/>
             </a:pPr>
             <a:r>
-              <a:rPr lang="en-US" sz="4300" dirty="0" smtClean="0">
+              <a:rPr lang="en-US" sz="3300" dirty="0">
                 <a:ln w="10160">
                   <a:solidFill>
                     <a:schemeClr val="accent1"/>
@@ -4509,7 +4759,7 @@
               </a:rPr>
               <a:t>Segmentation</a:t>
             </a:r>
-            <a:endParaRPr lang="nl-NL" sz="4300" dirty="0">
+            <a:endParaRPr lang="nl-NL" sz="3300" dirty="0">
               <a:ln w="10160">
                 <a:solidFill>
                   <a:schemeClr val="accent1"/>
@@ -4542,8 +4792,8 @@
         </p:nvSpPr>
         <p:spPr>
           <a:xfrm>
-            <a:off x="10837316" y="2700387"/>
-            <a:ext cx="4814249" cy="5184576"/>
+            <a:off x="8626857" y="1849066"/>
+            <a:ext cx="3804323" cy="4608512"/>
           </a:xfrm>
           <a:ln/>
         </p:spPr>
@@ -4563,7 +4813,7 @@
         </p:style>
         <p:txBody>
           <a:bodyPr>
-            <a:normAutofit lnSpcReduction="10000"/>
+            <a:normAutofit/>
           </a:bodyPr>
           <a:lstStyle/>
           <a:p>
@@ -4571,107 +4821,113 @@
               <a:buNone/>
             </a:pPr>
             <a:r>
-              <a:rPr lang="en-US" sz="1300" dirty="0" smtClean="0"/>
-              <a:t>A important part of the application is the segmentation which is the first part of the process. </a:t>
-            </a:r>
-            <a:r>
-              <a:rPr lang="en-US" sz="1300" dirty="0" smtClean="0"/>
-              <a:t>This part has the task of locating the license plate. The segmentation is done in the RGB domain. Therefore we looked at different kind of license plates and we made graphs of the data we acquired. With these graphs we made restrictions for our segmentation function. This is an example of one of those graphs:</a:t>
-            </a:r>
-          </a:p>
-          <a:p>
-            <a:pPr marL="0" indent="0">
-              <a:buNone/>
-            </a:pPr>
-            <a:endParaRPr lang="en-US" sz="1300" dirty="0" smtClean="0"/>
-          </a:p>
-          <a:p>
-            <a:pPr marL="0" indent="0">
-              <a:buNone/>
-            </a:pPr>
-            <a:endParaRPr lang="en-US" sz="1300" dirty="0" smtClean="0"/>
-          </a:p>
-          <a:p>
-            <a:pPr marL="0" indent="0">
-              <a:buNone/>
-            </a:pPr>
-            <a:endParaRPr lang="en-US" sz="1300" dirty="0" smtClean="0"/>
-          </a:p>
-          <a:p>
-            <a:pPr marL="0" indent="0">
-              <a:buNone/>
-            </a:pPr>
-            <a:endParaRPr lang="en-US" sz="1300" dirty="0" smtClean="0"/>
-          </a:p>
-          <a:p>
-            <a:pPr marL="0" indent="0">
-              <a:buNone/>
-            </a:pPr>
-            <a:endParaRPr lang="en-US" sz="1300" dirty="0" smtClean="0"/>
-          </a:p>
-          <a:p>
-            <a:pPr marL="0" indent="0">
-              <a:buNone/>
-            </a:pPr>
-            <a:endParaRPr lang="en-US" sz="1300" dirty="0" smtClean="0"/>
-          </a:p>
-          <a:p>
-            <a:pPr marL="0" indent="0">
-              <a:buNone/>
-            </a:pPr>
-            <a:endParaRPr lang="en-US" sz="1300" dirty="0" smtClean="0"/>
-          </a:p>
-          <a:p>
-            <a:pPr marL="0" indent="0">
-              <a:buNone/>
-            </a:pPr>
-            <a:endParaRPr lang="en-US" sz="1300" dirty="0" smtClean="0"/>
-          </a:p>
-          <a:p>
-            <a:pPr marL="0" indent="0">
-              <a:buNone/>
-            </a:pPr>
-            <a:endParaRPr lang="en-US" sz="1300" dirty="0" smtClean="0"/>
-          </a:p>
-          <a:p>
-            <a:pPr marL="0" indent="0">
-              <a:buNone/>
-            </a:pPr>
-            <a:endParaRPr lang="en-US" sz="1300" dirty="0" smtClean="0"/>
-          </a:p>
-          <a:p>
-            <a:pPr marL="0" indent="0">
-              <a:buNone/>
-            </a:pPr>
-            <a:endParaRPr lang="en-US" sz="1300" dirty="0" smtClean="0"/>
-          </a:p>
-          <a:p>
-            <a:pPr marL="0" indent="0">
-              <a:buNone/>
-            </a:pPr>
-            <a:endParaRPr lang="en-US" sz="1300" dirty="0" smtClean="0"/>
-          </a:p>
-          <a:p>
-            <a:pPr marL="0" indent="0">
-              <a:buNone/>
-            </a:pPr>
-            <a:endParaRPr lang="en-US" sz="1300" dirty="0" smtClean="0"/>
-          </a:p>
-          <a:p>
-            <a:pPr marL="0" indent="0">
-              <a:buNone/>
-            </a:pPr>
-            <a:endParaRPr lang="en-US" sz="1300" dirty="0" smtClean="0"/>
-          </a:p>
-          <a:p>
-            <a:pPr marL="0" indent="0">
-              <a:buNone/>
-            </a:pPr>
-            <a:r>
-              <a:rPr lang="en-US" sz="1300" dirty="0" smtClean="0"/>
-              <a:t>After checking the frame with the restrictions we segment the license plate from the hole frame and process this plate further with the character recognition</a:t>
-            </a:r>
-            <a:endParaRPr lang="nl-NL" sz="1300" dirty="0"/>
+              <a:rPr lang="en-US" sz="1100" dirty="0" smtClean="0"/>
+              <a:t>In our segmentation algorithm we locate the largest yellow object. Therefore created graphs of the colors of many license plates in the RGB domain. </a:t>
+            </a:r>
+            <a:r>
+              <a:rPr lang="en-US" sz="1100" dirty="0"/>
+              <a:t>With these graphs we </a:t>
+            </a:r>
+            <a:r>
+              <a:rPr lang="en-US" sz="1100" dirty="0" smtClean="0"/>
+              <a:t>were able to find restrictions </a:t>
+            </a:r>
+            <a:r>
+              <a:rPr lang="en-US" sz="1100" dirty="0"/>
+              <a:t>for our segmentation function. This is </a:t>
+            </a:r>
+            <a:r>
+              <a:rPr lang="en-US" sz="1100" dirty="0" smtClean="0"/>
+              <a:t>one </a:t>
+            </a:r>
+            <a:r>
+              <a:rPr lang="en-US" sz="1100" dirty="0"/>
+              <a:t>of those </a:t>
+            </a:r>
+            <a:r>
+              <a:rPr lang="en-US" sz="1100" dirty="0" smtClean="0"/>
+              <a:t>graphs, where we compare the red an green channel:</a:t>
+            </a:r>
+            <a:endParaRPr lang="en-US" sz="1100" dirty="0"/>
+          </a:p>
+          <a:p>
+            <a:pPr marL="0" indent="0">
+              <a:buNone/>
+            </a:pPr>
+            <a:endParaRPr lang="en-US" sz="1100" dirty="0"/>
+          </a:p>
+          <a:p>
+            <a:pPr marL="0" indent="0">
+              <a:buNone/>
+            </a:pPr>
+            <a:endParaRPr lang="en-US" sz="1100" dirty="0"/>
+          </a:p>
+          <a:p>
+            <a:pPr marL="0" indent="0">
+              <a:buNone/>
+            </a:pPr>
+            <a:endParaRPr lang="en-US" sz="1100" dirty="0"/>
+          </a:p>
+          <a:p>
+            <a:pPr marL="0" indent="0">
+              <a:buNone/>
+            </a:pPr>
+            <a:endParaRPr lang="en-US" sz="1100" dirty="0"/>
+          </a:p>
+          <a:p>
+            <a:pPr marL="0" indent="0">
+              <a:buNone/>
+            </a:pPr>
+            <a:endParaRPr lang="en-US" sz="1100" dirty="0"/>
+          </a:p>
+          <a:p>
+            <a:pPr marL="0" indent="0">
+              <a:buNone/>
+            </a:pPr>
+            <a:endParaRPr lang="en-US" sz="1100" dirty="0"/>
+          </a:p>
+          <a:p>
+            <a:pPr marL="0" indent="0">
+              <a:buNone/>
+            </a:pPr>
+            <a:endParaRPr lang="en-US" sz="1100" dirty="0"/>
+          </a:p>
+          <a:p>
+            <a:pPr marL="0" indent="0">
+              <a:buNone/>
+            </a:pPr>
+            <a:endParaRPr lang="en-US" sz="1100" dirty="0"/>
+          </a:p>
+          <a:p>
+            <a:pPr marL="0" indent="0">
+              <a:buNone/>
+            </a:pPr>
+            <a:endParaRPr lang="en-US" sz="1100" dirty="0" smtClean="0"/>
+          </a:p>
+          <a:p>
+            <a:pPr marL="0" indent="0">
+              <a:buNone/>
+            </a:pPr>
+            <a:endParaRPr lang="en-US" sz="1100" dirty="0" smtClean="0"/>
+          </a:p>
+          <a:p>
+            <a:pPr marL="0" indent="0">
+              <a:buNone/>
+            </a:pPr>
+            <a:r>
+              <a:rPr lang="en-US" sz="1100" dirty="0" smtClean="0"/>
+              <a:t>If we select these colors from an image, we get something like the image on the left. Then we select the largest rectangular object , sharpen it and threshold it with its mean value:</a:t>
+            </a:r>
+          </a:p>
+          <a:p>
+            <a:pPr marL="0" indent="0">
+              <a:buNone/>
+            </a:pPr>
+            <a:r>
+              <a:rPr lang="en-US" sz="1100" dirty="0"/>
+              <a:t>	</a:t>
+            </a:r>
+            <a:endParaRPr lang="nl-NL" sz="1100" dirty="0"/>
           </a:p>
         </p:txBody>
       </p:sp>
@@ -4687,7 +4943,7 @@
           <a:blip r:embed="rId2" cstate="print">
             <a:extLst>
               <a:ext uri="{28A0092B-C50C-407E-A947-70E740481C1C}">
-                <a14:useLocalDpi xmlns="" xmlns:a14="http://schemas.microsoft.com/office/drawing/2010/main" val="0"/>
+                <a14:useLocalDpi xmlns:a14="http://schemas.microsoft.com/office/drawing/2010/main" val="0"/>
               </a:ext>
             </a:extLst>
           </a:blip>
@@ -4698,8 +4954,8 @@
         </p:blipFill>
         <p:spPr bwMode="auto">
           <a:xfrm>
-            <a:off x="11248791" y="11197330"/>
-            <a:ext cx="4827262" cy="1248839"/>
+            <a:off x="10650066" y="-9430"/>
+            <a:ext cx="2153122" cy="537153"/>
           </a:xfrm>
           <a:prstGeom prst="rect">
             <a:avLst/>
@@ -4707,7 +4963,7 @@
           <a:noFill/>
           <a:extLst>
             <a:ext uri="{909E8E84-426E-40DD-AFC4-6F175D3DCCD1}">
-              <a14:hiddenFill xmlns="" xmlns:a14="http://schemas.microsoft.com/office/drawing/2010/main">
+              <a14:hiddenFill xmlns:a14="http://schemas.microsoft.com/office/drawing/2010/main">
                 <a:solidFill>
                   <a:srgbClr val="FFFFFF"/>
                 </a:solidFill>
@@ -4728,8 +4984,8 @@
         </p:nvSpPr>
         <p:spPr>
           <a:xfrm>
-            <a:off x="5794824" y="2570772"/>
-            <a:ext cx="4898476" cy="907301"/>
+            <a:off x="4554432" y="1986380"/>
+            <a:ext cx="3870881" cy="691391"/>
           </a:xfrm>
         </p:spPr>
         <p:txBody>
@@ -4742,7 +4998,7 @@
               <a:buNone/>
             </a:pPr>
             <a:r>
-              <a:rPr lang="en-US" sz="4000" dirty="0" smtClean="0">
+              <a:rPr lang="en-US" sz="3100" dirty="0">
                 <a:ln w="10160">
                   <a:solidFill>
                     <a:schemeClr val="accent1"/>
@@ -4762,7 +5018,7 @@
               </a:rPr>
               <a:t>Character Recognition</a:t>
             </a:r>
-            <a:endParaRPr lang="nl-NL" sz="4000" dirty="0">
+            <a:endParaRPr lang="nl-NL" sz="3100" dirty="0">
               <a:ln w="10160">
                 <a:solidFill>
                   <a:schemeClr val="accent1"/>
@@ -4791,8 +5047,8 @@
         </p:nvCxnSpPr>
         <p:spPr>
           <a:xfrm>
-            <a:off x="694475" y="2570772"/>
-            <a:ext cx="4814249" cy="0"/>
+            <a:off x="548789" y="1812182"/>
+            <a:ext cx="3804323" cy="0"/>
           </a:xfrm>
           <a:prstGeom prst="line">
             <a:avLst/>
@@ -4822,8 +5078,8 @@
         </p:nvCxnSpPr>
         <p:spPr>
           <a:xfrm>
-            <a:off x="5805603" y="3377262"/>
-            <a:ext cx="4814249" cy="0"/>
+            <a:off x="4587712" y="2573578"/>
+            <a:ext cx="3804323" cy="0"/>
           </a:xfrm>
           <a:prstGeom prst="line">
             <a:avLst/>
@@ -4853,8 +5109,8 @@
         </p:nvCxnSpPr>
         <p:spPr>
           <a:xfrm>
-            <a:off x="10878463" y="2671584"/>
-            <a:ext cx="4814249" cy="0"/>
+            <a:off x="8625242" y="1865595"/>
+            <a:ext cx="3804323" cy="0"/>
           </a:xfrm>
           <a:prstGeom prst="line">
             <a:avLst/>
@@ -4888,8 +5144,8 @@
         </p:nvSpPr>
         <p:spPr>
           <a:xfrm>
-            <a:off x="684188" y="5292675"/>
-            <a:ext cx="4814249" cy="699378"/>
+            <a:off x="548788" y="3721274"/>
+            <a:ext cx="3804323" cy="532948"/>
           </a:xfrm>
         </p:spPr>
         <p:txBody>
@@ -4902,7 +5158,7 @@
               <a:buNone/>
             </a:pPr>
             <a:r>
-              <a:rPr lang="en-US" sz="4300" dirty="0" smtClean="0">
+              <a:rPr lang="en-US" sz="3300" dirty="0">
                 <a:ln w="10160">
                   <a:solidFill>
                     <a:schemeClr val="accent1"/>
@@ -4922,7 +5178,7 @@
               </a:rPr>
               <a:t>GUI</a:t>
             </a:r>
-            <a:endParaRPr lang="nl-NL" sz="4300" dirty="0">
+            <a:endParaRPr lang="nl-NL" sz="3300" dirty="0">
               <a:ln w="10160">
                 <a:solidFill>
                   <a:schemeClr val="accent1"/>
@@ -4955,8 +5211,8 @@
         </p:nvSpPr>
         <p:spPr>
           <a:xfrm>
-            <a:off x="684188" y="5940747"/>
-            <a:ext cx="4814249" cy="5544616"/>
+            <a:off x="540660" y="4197799"/>
+            <a:ext cx="3804323" cy="5140849"/>
           </a:xfrm>
           <a:ln/>
         </p:spPr>
@@ -4984,93 +5240,101 @@
               <a:buNone/>
             </a:pPr>
             <a:r>
-              <a:rPr lang="en-US" sz="1400" dirty="0" smtClean="0"/>
-              <a:t> </a:t>
-            </a:r>
-            <a:r>
-              <a:rPr lang="en-US" sz="1400" dirty="0" smtClean="0"/>
-              <a:t>F</a:t>
-            </a:r>
-            <a:r>
-              <a:rPr lang="en-US" sz="1300" dirty="0" smtClean="0"/>
-              <a:t>or our application we needed a GUI, that’s why we used the MATLAB toolbox</a:t>
-            </a:r>
-            <a:r>
-              <a:rPr lang="en-US" sz="1300" i="1" dirty="0" smtClean="0"/>
-              <a:t> </a:t>
-            </a:r>
-            <a:r>
-              <a:rPr lang="en-US" sz="1300" dirty="0" smtClean="0"/>
-              <a:t>guide. As a result of this we made this GUI:</a:t>
-            </a:r>
-          </a:p>
-          <a:p>
-            <a:pPr marL="0" indent="0">
-              <a:buNone/>
-            </a:pPr>
-            <a:endParaRPr lang="en-US" sz="1300" dirty="0" smtClean="0"/>
-          </a:p>
-          <a:p>
-            <a:pPr marL="0" indent="0">
-              <a:buNone/>
-            </a:pPr>
-            <a:endParaRPr lang="en-US" sz="1300" dirty="0" smtClean="0"/>
-          </a:p>
-          <a:p>
-            <a:pPr marL="0" indent="0">
-              <a:buNone/>
-            </a:pPr>
-            <a:endParaRPr lang="en-US" sz="1300" dirty="0" smtClean="0"/>
-          </a:p>
-          <a:p>
-            <a:pPr marL="0" indent="0">
-              <a:buNone/>
-            </a:pPr>
-            <a:endParaRPr lang="en-US" sz="1300" dirty="0" smtClean="0"/>
-          </a:p>
-          <a:p>
-            <a:pPr marL="0" indent="0">
-              <a:buNone/>
-            </a:pPr>
-            <a:endParaRPr lang="en-US" sz="1300" dirty="0" smtClean="0"/>
-          </a:p>
-          <a:p>
-            <a:pPr marL="0" indent="0">
-              <a:buNone/>
-            </a:pPr>
-            <a:endParaRPr lang="en-US" sz="1300" dirty="0" smtClean="0"/>
-          </a:p>
-          <a:p>
-            <a:pPr marL="0" indent="0">
-              <a:buNone/>
-            </a:pPr>
-            <a:endParaRPr lang="en-US" sz="1300" dirty="0" smtClean="0"/>
-          </a:p>
-          <a:p>
-            <a:pPr marL="0" indent="0">
-              <a:buNone/>
-            </a:pPr>
-            <a:endParaRPr lang="en-US" sz="1300" dirty="0" smtClean="0"/>
-          </a:p>
-          <a:p>
-            <a:pPr marL="0" indent="0">
-              <a:buNone/>
-            </a:pPr>
-            <a:endParaRPr lang="en-US" sz="1300" dirty="0" smtClean="0"/>
-          </a:p>
-          <a:p>
-            <a:pPr marL="0" indent="0">
-              <a:buNone/>
-            </a:pPr>
-            <a:endParaRPr lang="en-US" sz="1300" dirty="0" smtClean="0"/>
-          </a:p>
-          <a:p>
-            <a:pPr marL="0" indent="0">
-              <a:buNone/>
-            </a:pPr>
-            <a:r>
-              <a:rPr lang="en-US" sz="1300" dirty="0" smtClean="0"/>
-              <a:t>The GUI consist of three important parts:</a:t>
+              <a:rPr lang="en-US" sz="1100" dirty="0" smtClean="0"/>
+              <a:t>Our application required a GUI, which we created with the GUIDE toolbox in </a:t>
+            </a:r>
+            <a:r>
+              <a:rPr lang="en-US" sz="1100" dirty="0" err="1" smtClean="0"/>
+              <a:t>MatLab</a:t>
+            </a:r>
+            <a:r>
+              <a:rPr lang="en-US" sz="1100" dirty="0"/>
+              <a:t>:</a:t>
+            </a:r>
+          </a:p>
+          <a:p>
+            <a:pPr marL="0" indent="0">
+              <a:buNone/>
+            </a:pPr>
+            <a:endParaRPr lang="en-US" sz="1100" dirty="0"/>
+          </a:p>
+          <a:p>
+            <a:pPr marL="0" indent="0">
+              <a:buNone/>
+            </a:pPr>
+            <a:endParaRPr lang="en-US" sz="1100" dirty="0"/>
+          </a:p>
+          <a:p>
+            <a:pPr marL="0" indent="0">
+              <a:buNone/>
+            </a:pPr>
+            <a:endParaRPr lang="en-US" sz="1100" dirty="0"/>
+          </a:p>
+          <a:p>
+            <a:pPr marL="0" indent="0">
+              <a:buNone/>
+            </a:pPr>
+            <a:endParaRPr lang="en-US" sz="1100" dirty="0"/>
+          </a:p>
+          <a:p>
+            <a:pPr marL="0" indent="0">
+              <a:buNone/>
+            </a:pPr>
+            <a:endParaRPr lang="en-US" sz="1100" dirty="0"/>
+          </a:p>
+          <a:p>
+            <a:pPr marL="0" indent="0">
+              <a:buNone/>
+            </a:pPr>
+            <a:endParaRPr lang="en-US" sz="1100" dirty="0"/>
+          </a:p>
+          <a:p>
+            <a:pPr marL="0" indent="0">
+              <a:buNone/>
+            </a:pPr>
+            <a:endParaRPr lang="en-US" sz="1100" dirty="0"/>
+          </a:p>
+          <a:p>
+            <a:pPr marL="0" indent="0">
+              <a:buNone/>
+            </a:pPr>
+            <a:endParaRPr lang="en-US" sz="1100" dirty="0"/>
+          </a:p>
+          <a:p>
+            <a:pPr marL="0" indent="0">
+              <a:buNone/>
+            </a:pPr>
+            <a:endParaRPr lang="en-US" sz="1100" dirty="0" smtClean="0"/>
+          </a:p>
+          <a:p>
+            <a:pPr marL="0" indent="0">
+              <a:buNone/>
+            </a:pPr>
+            <a:endParaRPr lang="en-US" sz="1100" dirty="0"/>
+          </a:p>
+          <a:p>
+            <a:pPr marL="0" indent="0">
+              <a:buNone/>
+            </a:pPr>
+            <a:endParaRPr lang="en-US" sz="1100" dirty="0"/>
+          </a:p>
+          <a:p>
+            <a:pPr marL="0" indent="0">
+              <a:buNone/>
+            </a:pPr>
+            <a:endParaRPr lang="en-US" sz="1100" dirty="0" smtClean="0"/>
+          </a:p>
+          <a:p>
+            <a:pPr marL="0" indent="0">
+              <a:buNone/>
+            </a:pPr>
+            <a:r>
+              <a:rPr lang="en-US" sz="1100" dirty="0" smtClean="0"/>
+              <a:t>The </a:t>
+            </a:r>
+            <a:r>
+              <a:rPr lang="en-US" sz="1100" dirty="0"/>
+              <a:t>GUI consist of three important parts:</a:t>
             </a:r>
           </a:p>
           <a:p>
@@ -5079,9 +5343,14 @@
               <a:buChar char="-"/>
             </a:pPr>
             <a:r>
-              <a:rPr lang="en-US" sz="1300" dirty="0" smtClean="0"/>
-              <a:t>The area where it displays the video to be processed</a:t>
-            </a:r>
+              <a:rPr lang="en-US" sz="1100" dirty="0"/>
+              <a:t>The area where it displays the video </a:t>
+            </a:r>
+            <a:r>
+              <a:rPr lang="en-US" sz="1100" dirty="0" smtClean="0"/>
+              <a:t>being processed</a:t>
+            </a:r>
+            <a:endParaRPr lang="en-US" sz="1100" dirty="0"/>
           </a:p>
           <a:p>
             <a:pPr marL="0" indent="0">
@@ -5089,9 +5358,14 @@
               <a:buChar char="-"/>
             </a:pPr>
             <a:r>
-              <a:rPr lang="en-US" sz="1300" dirty="0" smtClean="0"/>
-              <a:t>The three buttons</a:t>
-            </a:r>
+              <a:rPr lang="en-US" sz="1100" dirty="0"/>
+              <a:t>The three </a:t>
+            </a:r>
+            <a:r>
+              <a:rPr lang="en-US" sz="1100" dirty="0" smtClean="0"/>
+              <a:t>buttons: To start, import a video and to reset</a:t>
+            </a:r>
+            <a:endParaRPr lang="en-US" sz="1100" dirty="0"/>
           </a:p>
           <a:p>
             <a:pPr marL="0" indent="0">
@@ -5099,160 +5373,180 @@
               <a:buChar char="-"/>
             </a:pPr>
             <a:r>
-              <a:rPr lang="en-US" sz="1300" dirty="0" smtClean="0"/>
-              <a:t>The list with results</a:t>
-            </a:r>
-          </a:p>
-          <a:p>
-            <a:pPr marL="0" indent="0">
-              <a:buNone/>
-            </a:pPr>
-            <a:r>
-              <a:rPr lang="en-US" sz="1300" dirty="0" smtClean="0"/>
-              <a:t>These three buttons are: An import video button, a start/pause button and a reset button. The GUI also consists of the part which says what frame your are looking at and it has some time indicators like the time the video has played and the average time spend on each frame in </a:t>
-            </a:r>
-            <a:r>
-              <a:rPr lang="en-US" sz="1300" dirty="0" smtClean="0"/>
-              <a:t>milliseconds. The results are displayed in this way: </a:t>
-            </a:r>
-          </a:p>
-          <a:p>
-            <a:pPr marL="0" indent="0">
-              <a:buNone/>
-            </a:pPr>
-            <a:endParaRPr lang="en-US" sz="1300" dirty="0" smtClean="0"/>
-          </a:p>
-          <a:p>
-            <a:pPr marL="0" indent="0">
-              <a:buNone/>
-            </a:pPr>
-            <a:endParaRPr lang="en-US" sz="1400" dirty="0" smtClean="0"/>
-          </a:p>
-          <a:p>
-            <a:pPr marL="0" indent="0">
-              <a:buNone/>
-            </a:pPr>
-            <a:endParaRPr lang="en-US" sz="1400" dirty="0" smtClean="0"/>
-          </a:p>
-          <a:p>
-            <a:pPr marL="0" indent="0">
-              <a:buNone/>
-            </a:pPr>
-            <a:endParaRPr lang="en-US" sz="1400" dirty="0" smtClean="0"/>
-          </a:p>
-          <a:p>
-            <a:pPr marL="0" indent="0">
-              <a:buNone/>
-            </a:pPr>
-            <a:endParaRPr lang="en-US" sz="1400" dirty="0" smtClean="0"/>
-          </a:p>
-          <a:p>
-            <a:pPr marL="0" indent="0">
-              <a:buNone/>
-            </a:pPr>
-            <a:endParaRPr lang="en-US" sz="1400" dirty="0" smtClean="0"/>
-          </a:p>
-          <a:p>
-            <a:pPr marL="0" indent="0">
-              <a:buNone/>
-            </a:pPr>
-            <a:endParaRPr lang="en-US" sz="1400" dirty="0" smtClean="0"/>
-          </a:p>
-          <a:p>
-            <a:pPr marL="0" indent="0">
-              <a:buNone/>
-            </a:pPr>
-            <a:endParaRPr lang="en-US" sz="1400" dirty="0" smtClean="0"/>
-          </a:p>
-          <a:p>
-            <a:pPr marL="0" indent="0">
-              <a:buNone/>
-            </a:pPr>
-            <a:endParaRPr lang="en-US" sz="1400" dirty="0" smtClean="0"/>
-          </a:p>
-          <a:p>
-            <a:pPr marL="0" indent="0">
-              <a:buNone/>
-            </a:pPr>
-            <a:endParaRPr lang="en-US" sz="1400" dirty="0" smtClean="0"/>
-          </a:p>
-          <a:p>
-            <a:pPr marL="0" indent="0">
-              <a:buNone/>
-            </a:pPr>
-            <a:endParaRPr lang="en-US" sz="1400" dirty="0" smtClean="0"/>
-          </a:p>
-          <a:p>
-            <a:pPr marL="0" indent="0">
-              <a:buNone/>
-            </a:pPr>
-            <a:endParaRPr lang="en-US" sz="1400" dirty="0" smtClean="0"/>
-          </a:p>
-          <a:p>
-            <a:pPr marL="0" indent="0">
-              <a:buNone/>
-            </a:pPr>
-            <a:endParaRPr lang="en-US" sz="1400" dirty="0" smtClean="0"/>
-          </a:p>
-          <a:p>
-            <a:pPr marL="0" indent="0">
-              <a:buNone/>
-            </a:pPr>
-            <a:endParaRPr lang="en-US" sz="1400" dirty="0" smtClean="0"/>
-          </a:p>
-          <a:p>
-            <a:pPr marL="0" indent="0">
-              <a:buNone/>
-            </a:pPr>
-            <a:endParaRPr lang="en-US" sz="1400" dirty="0" smtClean="0"/>
-          </a:p>
-          <a:p>
-            <a:pPr marL="0" indent="0">
-              <a:buNone/>
-            </a:pPr>
-            <a:endParaRPr lang="en-US" sz="1400" dirty="0" smtClean="0"/>
-          </a:p>
-          <a:p>
-            <a:pPr marL="0" indent="0">
-              <a:buNone/>
-            </a:pPr>
-            <a:endParaRPr lang="en-US" sz="1400" dirty="0" smtClean="0"/>
-          </a:p>
-          <a:p>
-            <a:pPr marL="0" indent="0">
-              <a:buNone/>
-            </a:pPr>
-            <a:endParaRPr lang="en-US" sz="1400" dirty="0" smtClean="0"/>
-          </a:p>
-          <a:p>
-            <a:pPr marL="0" indent="0">
-              <a:buNone/>
-            </a:pPr>
-            <a:endParaRPr lang="en-US" sz="1400" dirty="0" smtClean="0"/>
-          </a:p>
-          <a:p>
-            <a:pPr marL="0" indent="0">
-              <a:buNone/>
-            </a:pPr>
-            <a:endParaRPr lang="en-US" sz="1400" dirty="0" smtClean="0"/>
-          </a:p>
-          <a:p>
-            <a:pPr marL="0" indent="0">
-              <a:buNone/>
-            </a:pPr>
-            <a:endParaRPr lang="en-US" sz="1400" dirty="0" smtClean="0"/>
-          </a:p>
-          <a:p>
-            <a:pPr marL="0" indent="0">
-              <a:buNone/>
-            </a:pPr>
-            <a:endParaRPr lang="en-US" sz="1400" dirty="0" smtClean="0"/>
-          </a:p>
-          <a:p>
-            <a:pPr marL="0" indent="0">
-              <a:buNone/>
-            </a:pPr>
-            <a:endParaRPr lang="nl-NL" sz="1400" dirty="0"/>
+              <a:rPr lang="en-US" sz="1100" dirty="0"/>
+              <a:t>The </a:t>
+            </a:r>
+            <a:r>
+              <a:rPr lang="en-US" sz="1100" dirty="0" smtClean="0"/>
+              <a:t>table which contains the license plates as text</a:t>
+            </a:r>
+            <a:endParaRPr lang="en-US" sz="1100" dirty="0"/>
+          </a:p>
+          <a:p>
+            <a:pPr marL="0" indent="0">
+              <a:buNone/>
+            </a:pPr>
+            <a:r>
+              <a:rPr lang="en-US" sz="1100" dirty="0" smtClean="0"/>
+              <a:t>The start button is also a pause button when the video is playing and the reset button resets the video and the table. </a:t>
+            </a:r>
+          </a:p>
+          <a:p>
+            <a:pPr marL="0" indent="0">
+              <a:buNone/>
+            </a:pPr>
+            <a:r>
+              <a:rPr lang="en-US" sz="1100" dirty="0" smtClean="0"/>
+              <a:t>The GUI also shows which frame is being processed and the average time it has taken to process a frame.</a:t>
+            </a:r>
+          </a:p>
+          <a:p>
+            <a:pPr marL="0" indent="0">
+              <a:buNone/>
+            </a:pPr>
+            <a:r>
+              <a:rPr lang="en-US" sz="1100" dirty="0" smtClean="0"/>
+              <a:t>When a license plate is found, it is inserted along with the frame in which it was found and the current timestamp: </a:t>
+            </a:r>
+            <a:endParaRPr lang="en-US" sz="1100" dirty="0"/>
+          </a:p>
+          <a:p>
+            <a:pPr marL="0" indent="0">
+              <a:buNone/>
+            </a:pPr>
+            <a:endParaRPr lang="en-US" sz="1100" dirty="0"/>
+          </a:p>
+          <a:p>
+            <a:pPr marL="0" indent="0">
+              <a:buNone/>
+            </a:pPr>
+            <a:endParaRPr lang="en-US" sz="1100" dirty="0"/>
+          </a:p>
+          <a:p>
+            <a:pPr marL="0" indent="0">
+              <a:buNone/>
+            </a:pPr>
+            <a:endParaRPr lang="en-US" sz="1100" dirty="0"/>
+          </a:p>
+          <a:p>
+            <a:pPr marL="0" indent="0">
+              <a:buNone/>
+            </a:pPr>
+            <a:endParaRPr lang="en-US" sz="1100" dirty="0"/>
+          </a:p>
+          <a:p>
+            <a:pPr marL="0" indent="0">
+              <a:buNone/>
+            </a:pPr>
+            <a:endParaRPr lang="en-US" sz="1100" dirty="0"/>
+          </a:p>
+          <a:p>
+            <a:pPr marL="0" indent="0">
+              <a:buNone/>
+            </a:pPr>
+            <a:endParaRPr lang="en-US" sz="1100" dirty="0"/>
+          </a:p>
+          <a:p>
+            <a:pPr marL="0" indent="0">
+              <a:buNone/>
+            </a:pPr>
+            <a:endParaRPr lang="en-US" sz="1100" dirty="0"/>
+          </a:p>
+          <a:p>
+            <a:pPr marL="0" indent="0">
+              <a:buNone/>
+            </a:pPr>
+            <a:endParaRPr lang="en-US" sz="1100" dirty="0"/>
+          </a:p>
+          <a:p>
+            <a:pPr marL="0" indent="0">
+              <a:buNone/>
+            </a:pPr>
+            <a:endParaRPr lang="en-US" sz="1100" dirty="0"/>
+          </a:p>
+          <a:p>
+            <a:pPr marL="0" indent="0">
+              <a:buNone/>
+            </a:pPr>
+            <a:endParaRPr lang="en-US" sz="1100" dirty="0"/>
+          </a:p>
+          <a:p>
+            <a:pPr marL="0" indent="0">
+              <a:buNone/>
+            </a:pPr>
+            <a:endParaRPr lang="en-US" sz="1100" dirty="0"/>
+          </a:p>
+          <a:p>
+            <a:pPr marL="0" indent="0">
+              <a:buNone/>
+            </a:pPr>
+            <a:endParaRPr lang="en-US" sz="1100" dirty="0"/>
+          </a:p>
+          <a:p>
+            <a:pPr marL="0" indent="0">
+              <a:buNone/>
+            </a:pPr>
+            <a:endParaRPr lang="en-US" sz="1100" dirty="0"/>
+          </a:p>
+          <a:p>
+            <a:pPr marL="0" indent="0">
+              <a:buNone/>
+            </a:pPr>
+            <a:endParaRPr lang="en-US" sz="1100" dirty="0"/>
+          </a:p>
+          <a:p>
+            <a:pPr marL="0" indent="0">
+              <a:buNone/>
+            </a:pPr>
+            <a:endParaRPr lang="en-US" sz="1100" dirty="0"/>
+          </a:p>
+          <a:p>
+            <a:pPr marL="0" indent="0">
+              <a:buNone/>
+            </a:pPr>
+            <a:endParaRPr lang="en-US" sz="1100" dirty="0"/>
+          </a:p>
+          <a:p>
+            <a:pPr marL="0" indent="0">
+              <a:buNone/>
+            </a:pPr>
+            <a:endParaRPr lang="en-US" sz="1100" dirty="0"/>
+          </a:p>
+          <a:p>
+            <a:pPr marL="0" indent="0">
+              <a:buNone/>
+            </a:pPr>
+            <a:endParaRPr lang="en-US" sz="1100" dirty="0"/>
+          </a:p>
+          <a:p>
+            <a:pPr marL="0" indent="0">
+              <a:buNone/>
+            </a:pPr>
+            <a:endParaRPr lang="en-US" sz="1100" dirty="0"/>
+          </a:p>
+          <a:p>
+            <a:pPr marL="0" indent="0">
+              <a:buNone/>
+            </a:pPr>
+            <a:endParaRPr lang="en-US" sz="1100" dirty="0"/>
+          </a:p>
+          <a:p>
+            <a:pPr marL="0" indent="0">
+              <a:buNone/>
+            </a:pPr>
+            <a:endParaRPr lang="en-US" sz="1100" dirty="0"/>
+          </a:p>
+          <a:p>
+            <a:pPr marL="0" indent="0">
+              <a:buNone/>
+            </a:pPr>
+            <a:endParaRPr lang="en-US" sz="1100" dirty="0"/>
+          </a:p>
+          <a:p>
+            <a:pPr marL="0" indent="0">
+              <a:buNone/>
+            </a:pPr>
+            <a:endParaRPr lang="nl-NL" sz="1100" dirty="0"/>
           </a:p>
         </p:txBody>
       </p:sp>
@@ -5264,8 +5558,8 @@
         </p:nvCxnSpPr>
         <p:spPr>
           <a:xfrm>
-            <a:off x="684188" y="5940747"/>
-            <a:ext cx="4814249" cy="0"/>
+            <a:off x="548790" y="4197799"/>
+            <a:ext cx="3804323" cy="0"/>
           </a:xfrm>
           <a:prstGeom prst="line">
             <a:avLst/>
@@ -5299,8 +5593,8 @@
         </p:nvSpPr>
         <p:spPr>
           <a:xfrm>
-            <a:off x="10878463" y="8461026"/>
-            <a:ext cx="4814249" cy="2736305"/>
+            <a:off x="8596397" y="7045408"/>
+            <a:ext cx="3804323" cy="2292489"/>
           </a:xfrm>
           <a:ln/>
         </p:spPr>
@@ -5328,12 +5622,28 @@
               <a:buNone/>
             </a:pPr>
             <a:r>
-              <a:rPr lang="en-US" sz="1300" dirty="0" smtClean="0"/>
-              <a:t>After we several weeks of processing this project has come to an end. Obviously we made a very good license plate recognition application, but there are always points to improve. </a:t>
-            </a:r>
-            <a:r>
-              <a:rPr lang="en-US" sz="1300" dirty="0" smtClean="0"/>
-              <a:t>This a list of some thing we could have done better:</a:t>
+              <a:rPr lang="en-US" sz="1100" dirty="0"/>
+              <a:t>After </a:t>
+            </a:r>
+            <a:r>
+              <a:rPr lang="en-US" sz="1100" dirty="0" smtClean="0"/>
+              <a:t>several </a:t>
+            </a:r>
+            <a:r>
+              <a:rPr lang="en-US" sz="1100" dirty="0"/>
+              <a:t>weeks </a:t>
+            </a:r>
+            <a:r>
+              <a:rPr lang="en-US" sz="1100" dirty="0" smtClean="0"/>
+              <a:t>this </a:t>
+            </a:r>
+            <a:r>
+              <a:rPr lang="en-US" sz="1100" dirty="0"/>
+              <a:t>project has come to an end. Obviously we made a very good license plate recognition application, but there are always points to </a:t>
+            </a:r>
+            <a:r>
+              <a:rPr lang="en-US" sz="1100" dirty="0" smtClean="0"/>
+              <a:t>improve:</a:t>
             </a:r>
           </a:p>
           <a:p>
@@ -5342,12 +5652,8 @@
               <a:buChar char="-"/>
             </a:pPr>
             <a:r>
-              <a:rPr lang="en-US" sz="1300" dirty="0" smtClean="0"/>
-              <a:t>In this application were are only able to recognize Dutch</a:t>
-            </a:r>
-            <a:r>
-              <a:rPr lang="en-US" sz="1300" dirty="0" smtClean="0"/>
-              <a:t> yellow license plates, all the others are not seen by the system because of the implementation of the segmentation</a:t>
+              <a:rPr lang="en-US" sz="1100" dirty="0" smtClean="0"/>
+              <a:t>We made the choice to only look for yellow license plates, but the implementation for other colors would be relatively easy. </a:t>
             </a:r>
           </a:p>
           <a:p>
@@ -5356,9 +5662,10 @@
               <a:buChar char="-"/>
             </a:pPr>
             <a:r>
-              <a:rPr lang="en-US" sz="1300" dirty="0" smtClean="0"/>
-              <a:t>When there are two license plate on 1 frame we are not able to detect this either</a:t>
-            </a:r>
+              <a:rPr lang="en-US" sz="1100" dirty="0" smtClean="0"/>
+              <a:t>Our program only looks for a single license plate because we did not have enough time to implement it for more.</a:t>
+            </a:r>
+            <a:endParaRPr lang="en-US" sz="1100" dirty="0"/>
           </a:p>
           <a:p>
             <a:pPr marL="0" indent="0">
@@ -5366,14 +5673,54 @@
               <a:buChar char="-"/>
             </a:pPr>
             <a:r>
-              <a:rPr lang="en-US" sz="1300" dirty="0" smtClean="0"/>
-              <a:t>In some cases, when the yellow license plates are heavily obscured or overexposed by its environment or the sun, we weren't able to detect </a:t>
-            </a:r>
-            <a:r>
-              <a:rPr lang="en-US" sz="1300" smtClean="0"/>
-              <a:t>the plates.  </a:t>
-            </a:r>
-            <a:endParaRPr lang="nl-NL" sz="1300" dirty="0"/>
+              <a:rPr lang="en-US" sz="1100" dirty="0"/>
+              <a:t>In some cases, when </a:t>
+            </a:r>
+            <a:r>
+              <a:rPr lang="en-US" sz="1100" dirty="0" smtClean="0"/>
+              <a:t>license </a:t>
+            </a:r>
+            <a:r>
+              <a:rPr lang="en-US" sz="1100" dirty="0"/>
+              <a:t>plates are </a:t>
+            </a:r>
+            <a:r>
+              <a:rPr lang="en-US" sz="1100" dirty="0" smtClean="0"/>
+              <a:t>obscured </a:t>
+            </a:r>
+            <a:r>
+              <a:rPr lang="en-US" sz="1100" dirty="0"/>
+              <a:t>or </a:t>
+            </a:r>
+            <a:r>
+              <a:rPr lang="en-US" sz="1100" dirty="0" smtClean="0"/>
+              <a:t>heavily overexposed, </a:t>
+            </a:r>
+            <a:r>
+              <a:rPr lang="en-US" sz="1100" dirty="0"/>
+              <a:t>we weren't able to detect </a:t>
+            </a:r>
+            <a:r>
+              <a:rPr lang="en-US" sz="1100" dirty="0" smtClean="0"/>
+              <a:t>them. </a:t>
+            </a:r>
+          </a:p>
+          <a:p>
+            <a:pPr marL="0" indent="0">
+              <a:buFontTx/>
+              <a:buChar char="-"/>
+            </a:pPr>
+            <a:r>
+              <a:rPr lang="en-US" sz="1100" dirty="0" smtClean="0"/>
+              <a:t>The speed at which it processes can probably be improved, but it’s already a lot faster than our first character recognition implementation with the built-in OCR function. </a:t>
+            </a:r>
+          </a:p>
+          <a:p>
+            <a:pPr marL="0" indent="0">
+              <a:buFontTx/>
+              <a:buChar char="-"/>
+            </a:pPr>
+            <a:endParaRPr lang="nl-NL" sz="1100" dirty="0"/>
           </a:p>
         </p:txBody>
       </p:sp>
@@ -5389,8 +5736,8 @@
         </p:nvSpPr>
         <p:spPr>
           <a:xfrm>
-            <a:off x="10837316" y="7740947"/>
-            <a:ext cx="4814249" cy="777687"/>
+            <a:off x="8589240" y="6529586"/>
+            <a:ext cx="3804323" cy="592621"/>
           </a:xfrm>
         </p:spPr>
         <p:txBody>
@@ -5403,7 +5750,7 @@
               <a:buNone/>
             </a:pPr>
             <a:r>
-              <a:rPr lang="en-US" sz="4300" dirty="0" smtClean="0">
+              <a:rPr lang="en-US" sz="3300" dirty="0">
                 <a:ln w="10160">
                   <a:solidFill>
                     <a:schemeClr val="accent1"/>
@@ -5423,7 +5770,7 @@
               </a:rPr>
               <a:t>Evaluation</a:t>
             </a:r>
-            <a:endParaRPr lang="nl-NL" sz="4300" dirty="0">
+            <a:endParaRPr lang="nl-NL" sz="3300" dirty="0">
               <a:ln w="10160">
                 <a:solidFill>
                   <a:schemeClr val="accent1"/>
@@ -5451,9 +5798,9 @@
           <p:nvPr/>
         </p:nvCxnSpPr>
         <p:spPr>
-          <a:xfrm>
-            <a:off x="10837316" y="8461027"/>
-            <a:ext cx="4886257" cy="0"/>
+          <a:xfrm flipV="1">
+            <a:off x="8596394" y="7042150"/>
+            <a:ext cx="3817856" cy="3259"/>
           </a:xfrm>
           <a:prstGeom prst="line">
             <a:avLst/>
@@ -5477,23 +5824,21 @@
       </p:cxnSp>
       <p:pic>
         <p:nvPicPr>
-          <p:cNvPr id="1027" name="Picture 3"/>
+          <p:cNvPr id="28" name="Picture 2"/>
           <p:cNvPicPr>
             <a:picLocks noChangeAspect="1" noChangeArrowheads="1"/>
           </p:cNvPicPr>
           <p:nvPr/>
         </p:nvPicPr>
-        <p:blipFill>
+        <p:blipFill rotWithShape="1">
           <a:blip r:embed="rId3" cstate="print"/>
-          <a:srcRect/>
-          <a:stretch>
-            <a:fillRect/>
-          </a:stretch>
+          <a:srcRect l="3091" t="14225" r="9299"/>
+          <a:stretch/>
         </p:blipFill>
         <p:spPr bwMode="auto">
           <a:xfrm>
-            <a:off x="684188" y="6516811"/>
-            <a:ext cx="4769842" cy="2304256"/>
+            <a:off x="9122566" y="2743846"/>
+            <a:ext cx="2913188" cy="2039248"/>
           </a:xfrm>
           <a:prstGeom prst="rect">
             <a:avLst/>
@@ -5510,14 +5855,20 @@
       </p:pic>
       <p:pic>
         <p:nvPicPr>
-          <p:cNvPr id="28" name="Picture 2"/>
+          <p:cNvPr id="5" name="Picture 2"/>
           <p:cNvPicPr>
             <a:picLocks noChangeAspect="1" noChangeArrowheads="1"/>
           </p:cNvPicPr>
           <p:nvPr/>
         </p:nvPicPr>
         <p:blipFill>
-          <a:blip r:embed="rId4" cstate="print"/>
+          <a:blip r:embed="rId4">
+            <a:extLst>
+              <a:ext uri="{28A0092B-C50C-407E-A947-70E740481C1C}">
+                <a14:useLocalDpi xmlns:a14="http://schemas.microsoft.com/office/drawing/2010/main" val="0"/>
+              </a:ext>
+            </a:extLst>
+          </a:blip>
           <a:srcRect/>
           <a:stretch>
             <a:fillRect/>
@@ -5525,32 +5876,63 @@
         </p:blipFill>
         <p:spPr bwMode="auto">
           <a:xfrm>
-            <a:off x="10981332" y="4140547"/>
-            <a:ext cx="4484498" cy="2736304"/>
+            <a:off x="4615840" y="5220244"/>
+            <a:ext cx="3714853" cy="182937"/>
           </a:xfrm>
           <a:prstGeom prst="rect">
             <a:avLst/>
           </a:prstGeom>
           <a:noFill/>
-          <a:ln w="9525">
+          <a:ln>
             <a:noFill/>
-            <a:miter lim="800000"/>
-            <a:headEnd/>
-            <a:tailEnd/>
           </a:ln>
           <a:effectLst/>
+          <a:extLst>
+            <a:ext uri="{909E8E84-426E-40DD-AFC4-6F175D3DCCD1}">
+              <a14:hiddenFill xmlns:a14="http://schemas.microsoft.com/office/drawing/2010/main">
+                <a:solidFill>
+                  <a:schemeClr val="accent1"/>
+                </a:solidFill>
+              </a14:hiddenFill>
+            </a:ext>
+            <a:ext uri="{91240B29-F687-4F45-9708-019B960494DF}">
+              <a14:hiddenLine xmlns:a14="http://schemas.microsoft.com/office/drawing/2010/main" w="9525">
+                <a:solidFill>
+                  <a:schemeClr val="tx1"/>
+                </a:solidFill>
+                <a:miter lim="800000"/>
+                <a:headEnd/>
+                <a:tailEnd/>
+              </a14:hiddenLine>
+            </a:ext>
+            <a:ext uri="{AF507438-7753-43E0-B8FC-AC1667EBCBE1}">
+              <a14:hiddenEffects xmlns:a14="http://schemas.microsoft.com/office/drawing/2010/main">
+                <a:effectLst>
+                  <a:outerShdw dist="35921" dir="2700000" algn="ctr" rotWithShape="0">
+                    <a:schemeClr val="bg2"/>
+                  </a:outerShdw>
+                </a:effectLst>
+              </a14:hiddenEffects>
+            </a:ext>
+          </a:extLst>
         </p:spPr>
       </p:pic>
       <p:pic>
         <p:nvPicPr>
-          <p:cNvPr id="2" name="Picture 2"/>
+          <p:cNvPr id="1028" name="Picture 4" descr="https://www.raivereniging.nl/binaries/content/gallery/rvportal/varia/kenteken-platen.jpg/kenteken-platen.jpg/rvportal%3AarticleImage"/>
           <p:cNvPicPr>
             <a:picLocks noChangeAspect="1" noChangeArrowheads="1"/>
           </p:cNvPicPr>
           <p:nvPr/>
         </p:nvPicPr>
         <p:blipFill>
-          <a:blip r:embed="rId5" cstate="print"/>
+          <a:blip r:embed="rId5">
+            <a:extLst>
+              <a:ext uri="{28A0092B-C50C-407E-A947-70E740481C1C}">
+                <a14:useLocalDpi xmlns:a14="http://schemas.microsoft.com/office/drawing/2010/main" val="0"/>
+              </a:ext>
+            </a:extLst>
+          </a:blip>
           <a:srcRect/>
           <a:stretch>
             <a:fillRect/>
@@ -5558,8 +5940,207 @@
         </p:blipFill>
         <p:spPr bwMode="auto">
           <a:xfrm>
-            <a:off x="828204" y="11053315"/>
-            <a:ext cx="4392488" cy="251478"/>
+            <a:off x="5635228" y="7004218"/>
+            <a:ext cx="1676079" cy="1074418"/>
+          </a:xfrm>
+          <a:prstGeom prst="rect">
+            <a:avLst/>
+          </a:prstGeom>
+          <a:noFill/>
+          <a:extLst>
+            <a:ext uri="{909E8E84-426E-40DD-AFC4-6F175D3DCCD1}">
+              <a14:hiddenFill xmlns:a14="http://schemas.microsoft.com/office/drawing/2010/main">
+                <a:solidFill>
+                  <a:srgbClr val="FFFFFF"/>
+                </a:solidFill>
+              </a14:hiddenFill>
+            </a:ext>
+          </a:extLst>
+        </p:spPr>
+      </p:pic>
+      <p:pic>
+        <p:nvPicPr>
+          <p:cNvPr id="1030" name="Picture 6" descr="http://puu.sh/eNeWJ/037e204d11.jpg/ss%20(2015-01-20%20at%2009.50.37).jpg"/>
+          <p:cNvPicPr>
+            <a:picLocks noChangeAspect="1" noChangeArrowheads="1"/>
+          </p:cNvPicPr>
+          <p:nvPr/>
+        </p:nvPicPr>
+        <p:blipFill>
+          <a:blip r:embed="rId6">
+            <a:extLst>
+              <a:ext uri="{28A0092B-C50C-407E-A947-70E740481C1C}">
+                <a14:useLocalDpi xmlns:a14="http://schemas.microsoft.com/office/drawing/2010/main" val="0"/>
+              </a:ext>
+            </a:extLst>
+          </a:blip>
+          <a:srcRect/>
+          <a:stretch>
+            <a:fillRect/>
+          </a:stretch>
+        </p:blipFill>
+        <p:spPr bwMode="auto">
+          <a:xfrm>
+            <a:off x="565776" y="4657378"/>
+            <a:ext cx="3796193" cy="2388031"/>
+          </a:xfrm>
+          <a:prstGeom prst="rect">
+            <a:avLst/>
+          </a:prstGeom>
+          <a:noFill/>
+          <a:extLst>
+            <a:ext uri="{909E8E84-426E-40DD-AFC4-6F175D3DCCD1}">
+              <a14:hiddenFill xmlns:a14="http://schemas.microsoft.com/office/drawing/2010/main">
+                <a:solidFill>
+                  <a:srgbClr val="FFFFFF"/>
+                </a:solidFill>
+              </a14:hiddenFill>
+            </a:ext>
+          </a:extLst>
+        </p:spPr>
+      </p:pic>
+      <p:pic>
+        <p:nvPicPr>
+          <p:cNvPr id="27" name="Picture 16" descr="http://puu.sh/eeFnz/bbf311be00.png/ss%20(2015-01-08%20at%2002.33.16).png"/>
+          <p:cNvPicPr>
+            <a:picLocks noChangeAspect="1" noChangeArrowheads="1"/>
+          </p:cNvPicPr>
+          <p:nvPr/>
+        </p:nvPicPr>
+        <p:blipFill>
+          <a:blip r:embed="rId7" cstate="print">
+            <a:extLst>
+              <a:ext uri="{28A0092B-C50C-407E-A947-70E740481C1C}">
+                <a14:useLocalDpi xmlns:a14="http://schemas.microsoft.com/office/drawing/2010/main" val="0"/>
+              </a:ext>
+            </a:extLst>
+          </a:blip>
+          <a:srcRect/>
+          <a:stretch>
+            <a:fillRect/>
+          </a:stretch>
+        </p:blipFill>
+        <p:spPr bwMode="auto">
+          <a:xfrm>
+            <a:off x="8696310" y="5309722"/>
+            <a:ext cx="1882850" cy="1133880"/>
+          </a:xfrm>
+          <a:prstGeom prst="rect">
+            <a:avLst/>
+          </a:prstGeom>
+          <a:noFill/>
+          <a:extLst>
+            <a:ext uri="{909E8E84-426E-40DD-AFC4-6F175D3DCCD1}">
+              <a14:hiddenFill xmlns:a14="http://schemas.microsoft.com/office/drawing/2010/main">
+                <a:solidFill>
+                  <a:srgbClr val="FFFFFF"/>
+                </a:solidFill>
+              </a14:hiddenFill>
+            </a:ext>
+          </a:extLst>
+        </p:spPr>
+      </p:pic>
+      <p:pic>
+        <p:nvPicPr>
+          <p:cNvPr id="29" name="Picture 24" descr="http://puu.sh/eeGlj/3653cd04be.png/ss%20(2015-01-08%20at%2002.44.07).png"/>
+          <p:cNvPicPr>
+            <a:picLocks noChangeAspect="1" noChangeArrowheads="1"/>
+          </p:cNvPicPr>
+          <p:nvPr/>
+        </p:nvPicPr>
+        <p:blipFill>
+          <a:blip r:embed="rId8" cstate="print">
+            <a:extLst>
+              <a:ext uri="{28A0092B-C50C-407E-A947-70E740481C1C}">
+                <a14:useLocalDpi xmlns:a14="http://schemas.microsoft.com/office/drawing/2010/main" val="0"/>
+              </a:ext>
+            </a:extLst>
+          </a:blip>
+          <a:srcRect/>
+          <a:stretch>
+            <a:fillRect/>
+          </a:stretch>
+        </p:blipFill>
+        <p:spPr bwMode="auto">
+          <a:xfrm>
+            <a:off x="10650066" y="5681153"/>
+            <a:ext cx="1619319" cy="323926"/>
+          </a:xfrm>
+          <a:prstGeom prst="rect">
+            <a:avLst/>
+          </a:prstGeom>
+          <a:noFill/>
+          <a:extLst>
+            <a:ext uri="{909E8E84-426E-40DD-AFC4-6F175D3DCCD1}">
+              <a14:hiddenFill xmlns:a14="http://schemas.microsoft.com/office/drawing/2010/main">
+                <a:solidFill>
+                  <a:srgbClr val="FFFFFF"/>
+                </a:solidFill>
+              </a14:hiddenFill>
+            </a:ext>
+          </a:extLst>
+        </p:spPr>
+      </p:pic>
+      <p:pic>
+        <p:nvPicPr>
+          <p:cNvPr id="30" name="Picture 22" descr="http://puu.sh/eeGcH/46e486f2cb.png"/>
+          <p:cNvPicPr>
+            <a:picLocks noChangeAspect="1" noChangeArrowheads="1"/>
+          </p:cNvPicPr>
+          <p:nvPr/>
+        </p:nvPicPr>
+        <p:blipFill>
+          <a:blip r:embed="rId9" cstate="print">
+            <a:extLst>
+              <a:ext uri="{28A0092B-C50C-407E-A947-70E740481C1C}">
+                <a14:useLocalDpi xmlns:a14="http://schemas.microsoft.com/office/drawing/2010/main" val="0"/>
+              </a:ext>
+            </a:extLst>
+          </a:blip>
+          <a:srcRect/>
+          <a:stretch>
+            <a:fillRect/>
+          </a:stretch>
+        </p:blipFill>
+        <p:spPr bwMode="auto">
+          <a:xfrm>
+            <a:off x="5590271" y="3400629"/>
+            <a:ext cx="1531403" cy="470698"/>
+          </a:xfrm>
+          <a:prstGeom prst="rect">
+            <a:avLst/>
+          </a:prstGeom>
+          <a:noFill/>
+          <a:extLst>
+            <a:ext uri="{909E8E84-426E-40DD-AFC4-6F175D3DCCD1}">
+              <a14:hiddenFill xmlns:a14="http://schemas.microsoft.com/office/drawing/2010/main">
+                <a:solidFill>
+                  <a:srgbClr val="FFFFFF"/>
+                </a:solidFill>
+              </a14:hiddenFill>
+            </a:ext>
+          </a:extLst>
+        </p:spPr>
+      </p:pic>
+      <p:pic>
+        <p:nvPicPr>
+          <p:cNvPr id="34" name="Picture 3"/>
+          <p:cNvPicPr>
+            <a:picLocks noChangeAspect="1" noChangeArrowheads="1"/>
+          </p:cNvPicPr>
+          <p:nvPr/>
+        </p:nvPicPr>
+        <p:blipFill>
+          <a:blip r:embed="rId10" cstate="print"/>
+          <a:srcRect/>
+          <a:stretch>
+            <a:fillRect/>
+          </a:stretch>
+        </p:blipFill>
+        <p:spPr bwMode="auto">
+          <a:xfrm>
+            <a:off x="928986" y="8977858"/>
+            <a:ext cx="2676899" cy="219106"/>
           </a:xfrm>
           <a:prstGeom prst="rect">
             <a:avLst/>
@@ -5577,7 +6158,7 @@
     </p:spTree>
     <p:extLst>
       <p:ext uri="{BB962C8B-B14F-4D97-AF65-F5344CB8AC3E}">
-        <p14:creationId xmlns="" xmlns:p14="http://schemas.microsoft.com/office/powerpoint/2010/main" val="2651525738"/>
+        <p14:creationId xmlns:p14="http://schemas.microsoft.com/office/powerpoint/2010/main" val="2651525738"/>
       </p:ext>
     </p:extLst>
   </p:cSld>

</xml_diff>

<commit_message>
Een paar dingen verbeterd en toegevoegd aan de laatste poster
</commit_message>
<xml_diff>
--- a/Posters/PosterTemplateEIND.pptx
+++ b/Posters/PosterTemplateEIND.pptx
@@ -4111,7 +4111,6 @@
               <a:rPr lang="nl-NL" sz="1100" dirty="0"/>
               <a:t>	4326156</a:t>
             </a:r>
-            <a:endParaRPr lang="nl-NL" sz="1100" dirty="0"/>
           </a:p>
         </p:txBody>
       </p:sp>
@@ -4648,37 +4647,58 @@
             </a:r>
             <a:r>
               <a:rPr lang="en-US" sz="1200" dirty="0"/>
-              <a:t> are the order and amount of characters which could be digits or alphabetic characters, like these ones:</a:t>
-            </a:r>
-          </a:p>
-          <a:p>
-            <a:pPr marL="0" indent="0">
-              <a:buNone/>
-            </a:pPr>
+              <a:t> are the order and amount of characters which could be digits or alphabetic characters, like these ones</a:t>
+            </a:r>
+            <a:r>
+              <a:rPr lang="en-US" sz="1200" dirty="0" smtClean="0"/>
+              <a:t>:</a:t>
+            </a:r>
             <a:endParaRPr lang="en-US" sz="1200" dirty="0"/>
           </a:p>
           <a:p>
-            <a:pPr marL="0" indent="0">
-              <a:buNone/>
-            </a:pPr>
-            <a:endParaRPr lang="en-US" sz="1200" dirty="0"/>
-          </a:p>
-          <a:p>
-            <a:pPr marL="0" indent="0">
-              <a:buNone/>
-            </a:pPr>
-            <a:endParaRPr lang="en-US" sz="1200" dirty="0"/>
-          </a:p>
-          <a:p>
-            <a:pPr marL="0" indent="0">
-              <a:buNone/>
-            </a:pPr>
-            <a:endParaRPr lang="en-US" sz="1200" dirty="0"/>
-          </a:p>
-          <a:p>
-            <a:pPr marL="0" indent="0">
-              <a:buNone/>
-            </a:pPr>
+            <a:pPr marL="0" indent="0" algn="ctr">
+              <a:buNone/>
+            </a:pPr>
+            <a:r>
+              <a:rPr lang="en-US" sz="1400" dirty="0" smtClean="0">
+                <a:latin typeface="Kenteken" pitchFamily="2" charset="0"/>
+              </a:rPr>
+              <a:t>4:+AA-11-AA ...7:+11-AAA-1</a:t>
+            </a:r>
+          </a:p>
+          <a:p>
+            <a:pPr marL="0" indent="0" algn="ctr">
+              <a:buNone/>
+            </a:pPr>
+            <a:r>
+              <a:rPr lang="en-US" sz="1400" dirty="0" smtClean="0">
+                <a:latin typeface="Kenteken" pitchFamily="2" charset="0"/>
+              </a:rPr>
+              <a:t>5:+AA-AA-11....8:+1-AAA-11</a:t>
+            </a:r>
+          </a:p>
+          <a:p>
+            <a:pPr marL="0" indent="0" algn="ctr">
+              <a:buNone/>
+            </a:pPr>
+            <a:r>
+              <a:rPr lang="en-US" sz="1400" dirty="0" smtClean="0">
+                <a:latin typeface="Kenteken" pitchFamily="2" charset="0"/>
+              </a:rPr>
+              <a:t>6:+11-AA-AA</a:t>
+            </a:r>
+            <a:r>
+              <a:rPr lang="en-US" sz="1400" dirty="0">
+                <a:latin typeface="Kenteken" pitchFamily="2" charset="0"/>
+              </a:rPr>
+              <a:t> </a:t>
+            </a:r>
+            <a:r>
+              <a:rPr lang="en-US" sz="1400" dirty="0" smtClean="0">
+                <a:latin typeface="Kenteken" pitchFamily="2" charset="0"/>
+              </a:rPr>
+              <a:t>...9:+AA-111-A</a:t>
+            </a:r>
             <a:endParaRPr lang="en-US" sz="1200" dirty="0"/>
           </a:p>
           <a:p>
@@ -4822,7 +4842,15 @@
             </a:pPr>
             <a:r>
               <a:rPr lang="en-US" sz="1100" dirty="0" smtClean="0"/>
-              <a:t>In our segmentation algorithm we locate the largest yellow object. Therefore created graphs of the colors of many license plates in the RGB domain. </a:t>
+              <a:t>In our segmentation algorithm we locate the largest yellow object. Therefore </a:t>
+            </a:r>
+            <a:r>
+              <a:rPr lang="en-US" sz="1100" dirty="0" smtClean="0"/>
+              <a:t>we created </a:t>
+            </a:r>
+            <a:r>
+              <a:rPr lang="en-US" sz="1100" dirty="0" smtClean="0"/>
+              <a:t>graphs of the colors of many license plates in the RGB domain. </a:t>
             </a:r>
             <a:r>
               <a:rPr lang="en-US" sz="1100" dirty="0"/>
@@ -4846,7 +4874,11 @@
             </a:r>
             <a:r>
               <a:rPr lang="en-US" sz="1100" dirty="0" smtClean="0"/>
-              <a:t>graphs, where we compare the red an green channel:</a:t>
+              <a:t>graphs, where we compare </a:t>
+            </a:r>
+            <a:r>
+              <a:rPr lang="en-US" sz="1100" dirty="0" smtClean="0"/>
+              <a:t>red versus green:</a:t>
             </a:r>
             <a:endParaRPr lang="en-US" sz="1100" dirty="0"/>
           </a:p>
@@ -4916,7 +4948,15 @@
             </a:pPr>
             <a:r>
               <a:rPr lang="en-US" sz="1100" dirty="0" smtClean="0"/>
-              <a:t>If we select these colors from an image, we get something like the image on the left. Then we select the largest rectangular object , sharpen it and threshold it with its mean value:</a:t>
+              <a:t>If we select these colors from an image, we get something like the image on the left. Then we select the largest rectangular </a:t>
+            </a:r>
+            <a:r>
+              <a:rPr lang="en-US" sz="1100" dirty="0" smtClean="0"/>
+              <a:t>object, </a:t>
+            </a:r>
+            <a:r>
+              <a:rPr lang="en-US" sz="1100" dirty="0" smtClean="0"/>
+              <a:t>sharpen it and threshold it with its mean value:</a:t>
             </a:r>
           </a:p>
           <a:p>
@@ -4954,7 +4994,7 @@
         </p:blipFill>
         <p:spPr bwMode="auto">
           <a:xfrm>
-            <a:off x="10650066" y="-9430"/>
+            <a:off x="10555747" y="408906"/>
             <a:ext cx="2153122" cy="537153"/>
           </a:xfrm>
           <a:prstGeom prst="rect">
@@ -5919,7 +5959,7 @@
       </p:pic>
       <p:pic>
         <p:nvPicPr>
-          <p:cNvPr id="1028" name="Picture 4" descr="https://www.raivereniging.nl/binaries/content/gallery/rvportal/varia/kenteken-platen.jpg/kenteken-platen.jpg/rvportal%3AarticleImage"/>
+          <p:cNvPr id="1030" name="Picture 6" descr="http://puu.sh/eNeWJ/037e204d11.jpg/ss%20(2015-01-20%20at%2009.50.37).jpg"/>
           <p:cNvPicPr>
             <a:picLocks noChangeAspect="1" noChangeArrowheads="1"/>
           </p:cNvPicPr>
@@ -5927,47 +5967,6 @@
         </p:nvPicPr>
         <p:blipFill>
           <a:blip r:embed="rId5">
-            <a:extLst>
-              <a:ext uri="{28A0092B-C50C-407E-A947-70E740481C1C}">
-                <a14:useLocalDpi xmlns:a14="http://schemas.microsoft.com/office/drawing/2010/main" val="0"/>
-              </a:ext>
-            </a:extLst>
-          </a:blip>
-          <a:srcRect/>
-          <a:stretch>
-            <a:fillRect/>
-          </a:stretch>
-        </p:blipFill>
-        <p:spPr bwMode="auto">
-          <a:xfrm>
-            <a:off x="5635228" y="7004218"/>
-            <a:ext cx="1676079" cy="1074418"/>
-          </a:xfrm>
-          <a:prstGeom prst="rect">
-            <a:avLst/>
-          </a:prstGeom>
-          <a:noFill/>
-          <a:extLst>
-            <a:ext uri="{909E8E84-426E-40DD-AFC4-6F175D3DCCD1}">
-              <a14:hiddenFill xmlns:a14="http://schemas.microsoft.com/office/drawing/2010/main">
-                <a:solidFill>
-                  <a:srgbClr val="FFFFFF"/>
-                </a:solidFill>
-              </a14:hiddenFill>
-            </a:ext>
-          </a:extLst>
-        </p:spPr>
-      </p:pic>
-      <p:pic>
-        <p:nvPicPr>
-          <p:cNvPr id="1030" name="Picture 6" descr="http://puu.sh/eNeWJ/037e204d11.jpg/ss%20(2015-01-20%20at%2009.50.37).jpg"/>
-          <p:cNvPicPr>
-            <a:picLocks noChangeAspect="1" noChangeArrowheads="1"/>
-          </p:cNvPicPr>
-          <p:nvPr/>
-        </p:nvPicPr>
-        <p:blipFill>
-          <a:blip r:embed="rId6">
             <a:extLst>
               <a:ext uri="{28A0092B-C50C-407E-A947-70E740481C1C}">
                 <a14:useLocalDpi xmlns:a14="http://schemas.microsoft.com/office/drawing/2010/main" val="0"/>
@@ -6001,88 +6000,6 @@
       </p:pic>
       <p:pic>
         <p:nvPicPr>
-          <p:cNvPr id="27" name="Picture 16" descr="http://puu.sh/eeFnz/bbf311be00.png/ss%20(2015-01-08%20at%2002.33.16).png"/>
-          <p:cNvPicPr>
-            <a:picLocks noChangeAspect="1" noChangeArrowheads="1"/>
-          </p:cNvPicPr>
-          <p:nvPr/>
-        </p:nvPicPr>
-        <p:blipFill>
-          <a:blip r:embed="rId7" cstate="print">
-            <a:extLst>
-              <a:ext uri="{28A0092B-C50C-407E-A947-70E740481C1C}">
-                <a14:useLocalDpi xmlns:a14="http://schemas.microsoft.com/office/drawing/2010/main" val="0"/>
-              </a:ext>
-            </a:extLst>
-          </a:blip>
-          <a:srcRect/>
-          <a:stretch>
-            <a:fillRect/>
-          </a:stretch>
-        </p:blipFill>
-        <p:spPr bwMode="auto">
-          <a:xfrm>
-            <a:off x="8696310" y="5309722"/>
-            <a:ext cx="1882850" cy="1133880"/>
-          </a:xfrm>
-          <a:prstGeom prst="rect">
-            <a:avLst/>
-          </a:prstGeom>
-          <a:noFill/>
-          <a:extLst>
-            <a:ext uri="{909E8E84-426E-40DD-AFC4-6F175D3DCCD1}">
-              <a14:hiddenFill xmlns:a14="http://schemas.microsoft.com/office/drawing/2010/main">
-                <a:solidFill>
-                  <a:srgbClr val="FFFFFF"/>
-                </a:solidFill>
-              </a14:hiddenFill>
-            </a:ext>
-          </a:extLst>
-        </p:spPr>
-      </p:pic>
-      <p:pic>
-        <p:nvPicPr>
-          <p:cNvPr id="29" name="Picture 24" descr="http://puu.sh/eeGlj/3653cd04be.png/ss%20(2015-01-08%20at%2002.44.07).png"/>
-          <p:cNvPicPr>
-            <a:picLocks noChangeAspect="1" noChangeArrowheads="1"/>
-          </p:cNvPicPr>
-          <p:nvPr/>
-        </p:nvPicPr>
-        <p:blipFill>
-          <a:blip r:embed="rId8" cstate="print">
-            <a:extLst>
-              <a:ext uri="{28A0092B-C50C-407E-A947-70E740481C1C}">
-                <a14:useLocalDpi xmlns:a14="http://schemas.microsoft.com/office/drawing/2010/main" val="0"/>
-              </a:ext>
-            </a:extLst>
-          </a:blip>
-          <a:srcRect/>
-          <a:stretch>
-            <a:fillRect/>
-          </a:stretch>
-        </p:blipFill>
-        <p:spPr bwMode="auto">
-          <a:xfrm>
-            <a:off x="10650066" y="5681153"/>
-            <a:ext cx="1619319" cy="323926"/>
-          </a:xfrm>
-          <a:prstGeom prst="rect">
-            <a:avLst/>
-          </a:prstGeom>
-          <a:noFill/>
-          <a:extLst>
-            <a:ext uri="{909E8E84-426E-40DD-AFC4-6F175D3DCCD1}">
-              <a14:hiddenFill xmlns:a14="http://schemas.microsoft.com/office/drawing/2010/main">
-                <a:solidFill>
-                  <a:srgbClr val="FFFFFF"/>
-                </a:solidFill>
-              </a14:hiddenFill>
-            </a:ext>
-          </a:extLst>
-        </p:spPr>
-      </p:pic>
-      <p:pic>
-        <p:nvPicPr>
           <p:cNvPr id="30" name="Picture 22" descr="http://puu.sh/eeGcH/46e486f2cb.png"/>
           <p:cNvPicPr>
             <a:picLocks noChangeAspect="1" noChangeArrowheads="1"/>
@@ -6090,7 +6007,7 @@
           <p:nvPr/>
         </p:nvPicPr>
         <p:blipFill>
-          <a:blip r:embed="rId9" cstate="print">
+          <a:blip r:embed="rId6" cstate="print">
             <a:extLst>
               <a:ext uri="{28A0092B-C50C-407E-A947-70E740481C1C}">
                 <a14:useLocalDpi xmlns:a14="http://schemas.microsoft.com/office/drawing/2010/main" val="0"/>
@@ -6124,14 +6041,20 @@
       </p:pic>
       <p:pic>
         <p:nvPicPr>
-          <p:cNvPr id="34" name="Picture 3"/>
+          <p:cNvPr id="35" name="Picture 5" descr="http://puu.sh/eBdkF/acb39a9e16.jpg"/>
           <p:cNvPicPr>
             <a:picLocks noChangeAspect="1" noChangeArrowheads="1"/>
           </p:cNvPicPr>
           <p:nvPr/>
         </p:nvPicPr>
         <p:blipFill>
-          <a:blip r:embed="rId10" cstate="print"/>
+          <a:blip r:embed="rId7">
+            <a:extLst>
+              <a:ext uri="{28A0092B-C50C-407E-A947-70E740481C1C}">
+                <a14:useLocalDpi xmlns:a14="http://schemas.microsoft.com/office/drawing/2010/main" val="0"/>
+              </a:ext>
+            </a:extLst>
+          </a:blip>
           <a:srcRect/>
           <a:stretch>
             <a:fillRect/>
@@ -6139,20 +6062,374 @@
         </p:blipFill>
         <p:spPr bwMode="auto">
           <a:xfrm>
-            <a:off x="928986" y="8977858"/>
-            <a:ext cx="2676899" cy="219106"/>
+            <a:off x="10766881" y="5309722"/>
+            <a:ext cx="1385688" cy="289547"/>
           </a:xfrm>
           <a:prstGeom prst="rect">
             <a:avLst/>
           </a:prstGeom>
           <a:noFill/>
-          <a:ln w="9525">
+          <a:extLst>
+            <a:ext uri="{909E8E84-426E-40DD-AFC4-6F175D3DCCD1}">
+              <a14:hiddenFill xmlns:a14="http://schemas.microsoft.com/office/drawing/2010/main">
+                <a:solidFill>
+                  <a:srgbClr val="FFFFFF"/>
+                </a:solidFill>
+              </a14:hiddenFill>
+            </a:ext>
+          </a:extLst>
+        </p:spPr>
+      </p:pic>
+      <p:pic>
+        <p:nvPicPr>
+          <p:cNvPr id="36" name="Picture 7" descr="http://puu.sh/eBdqf/063de46c95.jpg"/>
+          <p:cNvPicPr>
+            <a:picLocks noChangeAspect="1" noChangeArrowheads="1"/>
+          </p:cNvPicPr>
+          <p:nvPr/>
+        </p:nvPicPr>
+        <p:blipFill>
+          <a:blip r:embed="rId8">
+            <a:extLst>
+              <a:ext uri="{28A0092B-C50C-407E-A947-70E740481C1C}">
+                <a14:useLocalDpi xmlns:a14="http://schemas.microsoft.com/office/drawing/2010/main" val="0"/>
+              </a:ext>
+            </a:extLst>
+          </a:blip>
+          <a:srcRect/>
+          <a:stretch>
+            <a:fillRect/>
+          </a:stretch>
+        </p:blipFill>
+        <p:spPr bwMode="auto">
+          <a:xfrm>
+            <a:off x="10766881" y="5715604"/>
+            <a:ext cx="1385688" cy="284376"/>
+          </a:xfrm>
+          <a:prstGeom prst="rect">
+            <a:avLst/>
+          </a:prstGeom>
+          <a:noFill/>
+          <a:extLst>
+            <a:ext uri="{909E8E84-426E-40DD-AFC4-6F175D3DCCD1}">
+              <a14:hiddenFill xmlns:a14="http://schemas.microsoft.com/office/drawing/2010/main">
+                <a:solidFill>
+                  <a:srgbClr val="FFFFFF"/>
+                </a:solidFill>
+              </a14:hiddenFill>
+            </a:ext>
+          </a:extLst>
+        </p:spPr>
+      </p:pic>
+      <p:pic>
+        <p:nvPicPr>
+          <p:cNvPr id="2" name="Picture 2" descr="http://puu.sh/eNqFP/5e98268a3f.png"/>
+          <p:cNvPicPr>
+            <a:picLocks noChangeAspect="1" noChangeArrowheads="1"/>
+          </p:cNvPicPr>
+          <p:nvPr/>
+        </p:nvPicPr>
+        <p:blipFill rotWithShape="1">
+          <a:blip r:embed="rId9" cstate="print">
+            <a:extLst>
+              <a:ext uri="{28A0092B-C50C-407E-A947-70E740481C1C}">
+                <a14:useLocalDpi xmlns:a14="http://schemas.microsoft.com/office/drawing/2010/main" val="0"/>
+              </a:ext>
+            </a:extLst>
+          </a:blip>
+          <a:srcRect t="5400" b="-1"/>
+          <a:stretch/>
+        </p:blipFill>
+        <p:spPr bwMode="auto">
+          <a:xfrm>
+            <a:off x="10766882" y="6093619"/>
+            <a:ext cx="1385688" cy="349983"/>
+          </a:xfrm>
+          <a:prstGeom prst="rect">
+            <a:avLst/>
+          </a:prstGeom>
+          <a:noFill/>
+          <a:extLst>
+            <a:ext uri="{909E8E84-426E-40DD-AFC4-6F175D3DCCD1}">
+              <a14:hiddenFill xmlns:a14="http://schemas.microsoft.com/office/drawing/2010/main">
+                <a:solidFill>
+                  <a:srgbClr val="FFFFFF"/>
+                </a:solidFill>
+              </a14:hiddenFill>
+            </a:ext>
+          </a:extLst>
+        </p:spPr>
+      </p:pic>
+      <p:cxnSp>
+        <p:nvCxnSpPr>
+          <p:cNvPr id="7" name="Rechte verbindingslijn met pijl 6"/>
+          <p:cNvCxnSpPr/>
+          <p:nvPr/>
+        </p:nvCxnSpPr>
+        <p:spPr>
+          <a:xfrm>
+            <a:off x="10579160" y="5454495"/>
+            <a:ext cx="187721" cy="0"/>
+          </a:xfrm>
+          <a:prstGeom prst="straightConnector1">
+            <a:avLst/>
+          </a:prstGeom>
+          <a:ln>
+            <a:tailEnd type="arrow"/>
+          </a:ln>
+        </p:spPr>
+        <p:style>
+          <a:lnRef idx="1">
+            <a:schemeClr val="accent1"/>
+          </a:lnRef>
+          <a:fillRef idx="0">
+            <a:schemeClr val="accent1"/>
+          </a:fillRef>
+          <a:effectRef idx="0">
+            <a:schemeClr val="accent1"/>
+          </a:effectRef>
+          <a:fontRef idx="minor">
+            <a:schemeClr val="tx1"/>
+          </a:fontRef>
+        </p:style>
+      </p:cxnSp>
+      <p:cxnSp>
+        <p:nvCxnSpPr>
+          <p:cNvPr id="12" name="Rechte verbindingslijn met pijl 11"/>
+          <p:cNvCxnSpPr>
+            <a:stCxn id="35" idx="2"/>
+            <a:endCxn id="36" idx="0"/>
+          </p:cNvCxnSpPr>
+          <p:nvPr/>
+        </p:nvCxnSpPr>
+        <p:spPr>
+          <a:xfrm>
+            <a:off x="11459725" y="5599269"/>
+            <a:ext cx="0" cy="116335"/>
+          </a:xfrm>
+          <a:prstGeom prst="straightConnector1">
+            <a:avLst/>
+          </a:prstGeom>
+          <a:ln>
+            <a:tailEnd type="arrow"/>
+          </a:ln>
+        </p:spPr>
+        <p:style>
+          <a:lnRef idx="1">
+            <a:schemeClr val="accent1"/>
+          </a:lnRef>
+          <a:fillRef idx="0">
+            <a:schemeClr val="accent1"/>
+          </a:fillRef>
+          <a:effectRef idx="0">
+            <a:schemeClr val="accent1"/>
+          </a:effectRef>
+          <a:fontRef idx="minor">
+            <a:schemeClr val="tx1"/>
+          </a:fontRef>
+        </p:style>
+      </p:cxnSp>
+      <p:cxnSp>
+        <p:nvCxnSpPr>
+          <p:cNvPr id="14" name="Rechte verbindingslijn met pijl 13"/>
+          <p:cNvCxnSpPr>
+            <a:stCxn id="36" idx="2"/>
+            <a:endCxn id="2" idx="0"/>
+          </p:cNvCxnSpPr>
+          <p:nvPr/>
+        </p:nvCxnSpPr>
+        <p:spPr>
+          <a:xfrm>
+            <a:off x="11459725" y="5999980"/>
+            <a:ext cx="1" cy="93639"/>
+          </a:xfrm>
+          <a:prstGeom prst="straightConnector1">
+            <a:avLst/>
+          </a:prstGeom>
+          <a:ln>
+            <a:tailEnd type="arrow"/>
+          </a:ln>
+        </p:spPr>
+        <p:style>
+          <a:lnRef idx="1">
+            <a:schemeClr val="accent1"/>
+          </a:lnRef>
+          <a:fillRef idx="0">
+            <a:schemeClr val="accent1"/>
+          </a:fillRef>
+          <a:effectRef idx="0">
+            <a:schemeClr val="accent1"/>
+          </a:effectRef>
+          <a:fontRef idx="minor">
+            <a:schemeClr val="tx1"/>
+          </a:fontRef>
+        </p:style>
+      </p:cxnSp>
+      <p:pic>
+        <p:nvPicPr>
+          <p:cNvPr id="1027" name="Picture 3"/>
+          <p:cNvPicPr>
+            <a:picLocks noChangeAspect="1" noChangeArrowheads="1"/>
+          </p:cNvPicPr>
+          <p:nvPr/>
+        </p:nvPicPr>
+        <p:blipFill>
+          <a:blip r:embed="rId10">
+            <a:extLst>
+              <a:ext uri="{28A0092B-C50C-407E-A947-70E740481C1C}">
+                <a14:useLocalDpi xmlns:a14="http://schemas.microsoft.com/office/drawing/2010/main" val="0"/>
+              </a:ext>
+            </a:extLst>
+          </a:blip>
+          <a:srcRect/>
+          <a:stretch>
+            <a:fillRect/>
+          </a:stretch>
+        </p:blipFill>
+        <p:spPr bwMode="auto">
+          <a:xfrm>
+            <a:off x="8698578" y="5311712"/>
+            <a:ext cx="1885950" cy="1133475"/>
+          </a:xfrm>
+          <a:prstGeom prst="rect">
+            <a:avLst/>
+          </a:prstGeom>
+          <a:noFill/>
+          <a:ln>
             <a:noFill/>
-            <a:miter lim="800000"/>
-            <a:headEnd/>
-            <a:tailEnd/>
           </a:ln>
           <a:effectLst/>
+          <a:extLst>
+            <a:ext uri="{909E8E84-426E-40DD-AFC4-6F175D3DCCD1}">
+              <a14:hiddenFill xmlns:a14="http://schemas.microsoft.com/office/drawing/2010/main">
+                <a:solidFill>
+                  <a:schemeClr val="accent1"/>
+                </a:solidFill>
+              </a14:hiddenFill>
+            </a:ext>
+            <a:ext uri="{91240B29-F687-4F45-9708-019B960494DF}">
+              <a14:hiddenLine xmlns:a14="http://schemas.microsoft.com/office/drawing/2010/main" w="9525">
+                <a:solidFill>
+                  <a:schemeClr val="tx1"/>
+                </a:solidFill>
+                <a:miter lim="800000"/>
+                <a:headEnd/>
+                <a:tailEnd/>
+              </a14:hiddenLine>
+            </a:ext>
+            <a:ext uri="{AF507438-7753-43E0-B8FC-AC1667EBCBE1}">
+              <a14:hiddenEffects xmlns:a14="http://schemas.microsoft.com/office/drawing/2010/main">
+                <a:effectLst>
+                  <a:outerShdw dist="35921" dir="2700000" algn="ctr" rotWithShape="0">
+                    <a:schemeClr val="bg2"/>
+                  </a:outerShdw>
+                </a:effectLst>
+              </a14:hiddenEffects>
+            </a:ext>
+          </a:extLst>
+        </p:spPr>
+      </p:pic>
+      <p:pic>
+        <p:nvPicPr>
+          <p:cNvPr id="39" name="Picture 6"/>
+          <p:cNvPicPr>
+            <a:picLocks noChangeAspect="1" noChangeArrowheads="1"/>
+          </p:cNvPicPr>
+          <p:nvPr/>
+        </p:nvPicPr>
+        <p:blipFill>
+          <a:blip r:embed="rId11">
+            <a:extLst>
+              <a:ext uri="{28A0092B-C50C-407E-A947-70E740481C1C}">
+                <a14:useLocalDpi xmlns:a14="http://schemas.microsoft.com/office/drawing/2010/main" val="0"/>
+              </a:ext>
+            </a:extLst>
+          </a:blip>
+          <a:srcRect/>
+          <a:stretch>
+            <a:fillRect/>
+          </a:stretch>
+        </p:blipFill>
+        <p:spPr bwMode="auto">
+          <a:xfrm>
+            <a:off x="784970" y="-97372"/>
+            <a:ext cx="1285875" cy="1714500"/>
+          </a:xfrm>
+          <a:prstGeom prst="rect">
+            <a:avLst/>
+          </a:prstGeom>
+          <a:noFill/>
+          <a:ln>
+            <a:noFill/>
+          </a:ln>
+          <a:effectLst/>
+          <a:extLst>
+            <a:ext uri="{909E8E84-426E-40DD-AFC4-6F175D3DCCD1}">
+              <a14:hiddenFill xmlns:a14="http://schemas.microsoft.com/office/drawing/2010/main">
+                <a:solidFill>
+                  <a:schemeClr val="accent1"/>
+                </a:solidFill>
+              </a14:hiddenFill>
+            </a:ext>
+            <a:ext uri="{91240B29-F687-4F45-9708-019B960494DF}">
+              <a14:hiddenLine xmlns:a14="http://schemas.microsoft.com/office/drawing/2010/main" w="9525">
+                <a:solidFill>
+                  <a:schemeClr val="tx1"/>
+                </a:solidFill>
+                <a:miter lim="800000"/>
+                <a:headEnd/>
+                <a:tailEnd/>
+              </a14:hiddenLine>
+            </a:ext>
+            <a:ext uri="{AF507438-7753-43E0-B8FC-AC1667EBCBE1}">
+              <a14:hiddenEffects xmlns:a14="http://schemas.microsoft.com/office/drawing/2010/main">
+                <a:effectLst>
+                  <a:outerShdw dist="35921" dir="2700000" algn="ctr" rotWithShape="0">
+                    <a:schemeClr val="bg2"/>
+                  </a:outerShdw>
+                </a:effectLst>
+              </a14:hiddenEffects>
+            </a:ext>
+          </a:extLst>
+        </p:spPr>
+      </p:pic>
+      <p:pic>
+        <p:nvPicPr>
+          <p:cNvPr id="45" name="Picture 6" descr="http://puu.sh/eNeWJ/037e204d11.jpg/ss%20(2015-01-20%20at%2009.50.37).jpg"/>
+          <p:cNvPicPr>
+            <a:picLocks noChangeAspect="1" noChangeArrowheads="1"/>
+          </p:cNvPicPr>
+          <p:nvPr/>
+        </p:nvPicPr>
+        <p:blipFill rotWithShape="1">
+          <a:blip r:embed="rId5">
+            <a:extLst>
+              <a:ext uri="{28A0092B-C50C-407E-A947-70E740481C1C}">
+                <a14:useLocalDpi xmlns:a14="http://schemas.microsoft.com/office/drawing/2010/main" val="0"/>
+              </a:ext>
+            </a:extLst>
+          </a:blip>
+          <a:srcRect l="69904" t="5798" r="2622" b="86633"/>
+          <a:stretch/>
+        </p:blipFill>
+        <p:spPr bwMode="auto">
+          <a:xfrm>
+            <a:off x="1395984" y="8905849"/>
+            <a:ext cx="1944216" cy="336917"/>
+          </a:xfrm>
+          <a:prstGeom prst="rect">
+            <a:avLst/>
+          </a:prstGeom>
+          <a:noFill/>
+          <a:extLst>
+            <a:ext uri="{909E8E84-426E-40DD-AFC4-6F175D3DCCD1}">
+              <a14:hiddenFill xmlns:a14="http://schemas.microsoft.com/office/drawing/2010/main">
+                <a:solidFill>
+                  <a:srgbClr val="FFFFFF"/>
+                </a:solidFill>
+              </a14:hiddenFill>
+            </a:ext>
+          </a:extLst>
         </p:spPr>
       </p:pic>
     </p:spTree>

</xml_diff>